<commit_message>
Update insteraction of OpenStack services slide
</commit_message>
<xml_diff>
--- a/acci-iwbis.pptx
+++ b/acci-iwbis.pptx
@@ -46,6 +46,7 @@
     <p:sldId id="290" r:id="rId39"/>
     <p:sldId id="291" r:id="rId40"/>
     <p:sldId id="292" r:id="rId41"/>
+    <p:sldId id="293" r:id="rId42"/>
   </p:sldIdLst>
   <p:sldSz cx="12188825" cy="6858000"/>
   <p:notesSz cx="7010400" cy="9296400"/>
@@ -153,7 +154,7 @@
                 </a:uFill>
                 <a:latin typeface="Times New Roman"/>
               </a:rPr>
-              <a:t>&lt;header&gt;</a:t>
+              <a:t> </a:t>
             </a:r>
             <a:endParaRPr b="0" lang="en-US" sz="1400" spc="-1" strike="noStrike">
               <a:solidFill>
@@ -204,7 +205,7 @@
                 </a:uFill>
                 <a:latin typeface="Times New Roman"/>
               </a:rPr>
-              <a:t>&lt;date/time&gt;</a:t>
+              <a:t> </a:t>
             </a:r>
             <a:endParaRPr b="0" lang="en-US" sz="1400" spc="-1" strike="noStrike">
               <a:solidFill>
@@ -254,7 +255,7 @@
                 </a:uFill>
                 <a:latin typeface="Times New Roman"/>
               </a:rPr>
-              <a:t>&lt;footer&gt;</a:t>
+              <a:t> </a:t>
             </a:r>
             <a:endParaRPr b="0" lang="en-US" sz="1400" spc="-1" strike="noStrike">
               <a:solidFill>
@@ -293,7 +294,7 @@
           <a:bodyPr lIns="0" rIns="0" tIns="0" bIns="0" anchor="b"/>
           <a:p>
             <a:pPr algn="r"/>
-            <a:fld id="{A31D419F-39D9-4ECD-B0B1-8404FB6ED85D}" type="slidenum">
+            <a:fld id="{54F91368-838C-4E2F-BDA4-A175FD035FDE}" type="slidenum">
               <a:rPr b="0" lang="en-US" sz="1400" spc="-1" strike="noStrike">
                 <a:solidFill>
                   <a:srgbClr val="000000"/>
@@ -305,7 +306,7 @@
                 </a:uFill>
                 <a:latin typeface="Times New Roman"/>
               </a:rPr>
-              <a:t>&lt;number&gt;</a:t>
+              <a:t>1</a:t>
             </a:fld>
             <a:endParaRPr b="0" lang="en-US" sz="1400" spc="-1" strike="noStrike">
               <a:solidFill>
@@ -346,7 +347,7 @@
       </p:grpSpPr>
       <p:sp>
         <p:nvSpPr>
-          <p:cNvPr id="181" name="PlaceHolder 1"/>
+          <p:cNvPr id="183" name="PlaceHolder 1"/>
           <p:cNvSpPr>
             <a:spLocks noGrp="1"/>
           </p:cNvSpPr>
@@ -357,7 +358,7 @@
         <p:spPr>
           <a:xfrm>
             <a:off x="700920" y="4415760"/>
-            <a:ext cx="5605560" cy="4180680"/>
+            <a:ext cx="5604840" cy="4179960"/>
           </a:xfrm>
           <a:prstGeom prst="rect">
             <a:avLst/>
@@ -382,14 +383,14 @@
       </p:sp>
       <p:sp>
         <p:nvSpPr>
-          <p:cNvPr id="182" name="CustomShape 2"/>
+          <p:cNvPr id="184" name="CustomShape 2"/>
           <p:cNvSpPr/>
           <p:nvPr/>
         </p:nvSpPr>
         <p:spPr>
           <a:xfrm>
             <a:off x="3970800" y="0"/>
-            <a:ext cx="3034800" cy="461880"/>
+            <a:ext cx="3034080" cy="461160"/>
           </a:xfrm>
           <a:prstGeom prst="rect">
             <a:avLst/>
@@ -408,14 +409,14 @@
       </p:sp>
       <p:sp>
         <p:nvSpPr>
-          <p:cNvPr id="183" name="CustomShape 3"/>
+          <p:cNvPr id="185" name="CustomShape 3"/>
           <p:cNvSpPr/>
           <p:nvPr/>
         </p:nvSpPr>
         <p:spPr>
           <a:xfrm>
             <a:off x="6040800" y="8830080"/>
-            <a:ext cx="965160" cy="461880"/>
+            <a:ext cx="964440" cy="461160"/>
           </a:xfrm>
           <a:prstGeom prst="rect">
             <a:avLst/>
@@ -434,14 +435,14 @@
       </p:sp>
       <p:sp>
         <p:nvSpPr>
-          <p:cNvPr id="184" name="CustomShape 4"/>
+          <p:cNvPr id="186" name="CustomShape 4"/>
           <p:cNvSpPr/>
           <p:nvPr/>
         </p:nvSpPr>
         <p:spPr>
           <a:xfrm>
             <a:off x="0" y="0"/>
-            <a:ext cx="3034800" cy="461880"/>
+            <a:ext cx="3034080" cy="461160"/>
           </a:xfrm>
           <a:prstGeom prst="rect">
             <a:avLst/>
@@ -496,14 +497,14 @@
       </p:sp>
       <p:sp>
         <p:nvSpPr>
-          <p:cNvPr id="185" name="CustomShape 5"/>
+          <p:cNvPr id="187" name="CustomShape 5"/>
           <p:cNvSpPr/>
           <p:nvPr/>
         </p:nvSpPr>
         <p:spPr>
           <a:xfrm>
             <a:off x="0" y="8830080"/>
-            <a:ext cx="5920920" cy="369360"/>
+            <a:ext cx="5920200" cy="368640"/>
           </a:xfrm>
           <a:prstGeom prst="rect">
             <a:avLst/>
@@ -3871,7 +3872,7 @@
         <p:spPr>
           <a:xfrm>
             <a:off x="9866880" y="5996880"/>
-            <a:ext cx="1985400" cy="644040"/>
+            <a:ext cx="1984680" cy="643320"/>
           </a:xfrm>
           <a:prstGeom prst="rect">
             <a:avLst/>
@@ -4280,7 +4281,7 @@
         <p:spPr>
           <a:xfrm>
             <a:off x="9866880" y="5996880"/>
-            <a:ext cx="1985400" cy="644040"/>
+            <a:ext cx="1984680" cy="643320"/>
           </a:xfrm>
           <a:prstGeom prst="rect">
             <a:avLst/>
@@ -4678,7 +4679,7 @@
         <p:spPr>
           <a:xfrm>
             <a:off x="978840" y="2109600"/>
-            <a:ext cx="10234800" cy="994320"/>
+            <a:ext cx="10234080" cy="993600"/>
           </a:xfrm>
           <a:prstGeom prst="rect">
             <a:avLst/>
@@ -4703,7 +4704,7 @@
               </a:lnSpc>
             </a:pPr>
             <a:r>
-              <a:rPr b="1" lang="en-US" sz="8000" spc="-128" strike="noStrike">
+              <a:rPr b="1" lang="en-US" sz="8000" spc="-123" strike="noStrike">
                 <a:solidFill>
                   <a:srgbClr val="595959"/>
                 </a:solidFill>
@@ -4740,7 +4741,7 @@
         <p:spPr>
           <a:xfrm>
             <a:off x="978840" y="4532040"/>
-            <a:ext cx="10234800" cy="495720"/>
+            <a:ext cx="10234080" cy="495000"/>
           </a:xfrm>
           <a:prstGeom prst="rect">
             <a:avLst/>
@@ -4765,7 +4766,7 @@
               </a:lnSpc>
             </a:pPr>
             <a:r>
-              <a:rPr b="0" lang="en-US" sz="3600" spc="-49" strike="noStrike">
+              <a:rPr b="0" lang="en-US" sz="3600" spc="-43" strike="noStrike">
                 <a:solidFill>
                   <a:srgbClr val="595959"/>
                 </a:solidFill>
@@ -4820,7 +4821,7 @@
         <p:spPr>
           <a:xfrm>
             <a:off x="958680" y="3188880"/>
-            <a:ext cx="9450720" cy="645120"/>
+            <a:ext cx="9450000" cy="644400"/>
           </a:xfrm>
           <a:prstGeom prst="rect">
             <a:avLst/>
@@ -4934,7 +4935,7 @@
         <p:spPr>
           <a:xfrm>
             <a:off x="519120" y="228600"/>
-            <a:ext cx="11145960" cy="744840"/>
+            <a:ext cx="11145240" cy="744120"/>
           </a:xfrm>
           <a:prstGeom prst="rect">
             <a:avLst/>
@@ -4959,7 +4960,7 @@
               </a:lnSpc>
             </a:pPr>
             <a:r>
-              <a:rPr b="0" lang="en-US" sz="5400" spc="-77" strike="noStrike">
+              <a:rPr b="0" lang="en-US" sz="5400" spc="-72" strike="noStrike">
                 <a:solidFill>
                   <a:srgbClr val="595959"/>
                 </a:solidFill>
@@ -5000,7 +5001,7 @@
         <p:spPr>
           <a:xfrm>
             <a:off x="1010520" y="1186200"/>
-            <a:ext cx="10227240" cy="4512240"/>
+            <a:ext cx="10226520" cy="4511520"/>
           </a:xfrm>
           <a:prstGeom prst="rect">
             <a:avLst/>
@@ -5068,7 +5069,7 @@
         <p:spPr>
           <a:xfrm>
             <a:off x="519120" y="228600"/>
-            <a:ext cx="11145960" cy="744840"/>
+            <a:ext cx="11145240" cy="744120"/>
           </a:xfrm>
           <a:prstGeom prst="rect">
             <a:avLst/>
@@ -5093,7 +5094,7 @@
               </a:lnSpc>
             </a:pPr>
             <a:r>
-              <a:rPr b="0" lang="en-US" sz="5400" spc="-77" strike="noStrike">
+              <a:rPr b="0" lang="en-US" sz="5400" spc="-72" strike="noStrike">
                 <a:solidFill>
                   <a:srgbClr val="595959"/>
                 </a:solidFill>
@@ -5134,7 +5135,7 @@
         <p:spPr>
           <a:xfrm>
             <a:off x="1372680" y="1066680"/>
-            <a:ext cx="8437320" cy="5550840"/>
+            <a:ext cx="8436600" cy="5550120"/>
           </a:xfrm>
           <a:prstGeom prst="rect">
             <a:avLst/>
@@ -5202,7 +5203,7 @@
         <p:spPr>
           <a:xfrm>
             <a:off x="519120" y="228600"/>
-            <a:ext cx="11145960" cy="744840"/>
+            <a:ext cx="11145240" cy="744120"/>
           </a:xfrm>
           <a:prstGeom prst="rect">
             <a:avLst/>
@@ -5227,7 +5228,7 @@
               </a:lnSpc>
             </a:pPr>
             <a:r>
-              <a:rPr b="0" lang="en-US" sz="5400" spc="-77" strike="noStrike">
+              <a:rPr b="0" lang="en-US" sz="5400" spc="-72" strike="noStrike">
                 <a:solidFill>
                   <a:srgbClr val="595959"/>
                 </a:solidFill>
@@ -5268,7 +5269,7 @@
         <p:spPr>
           <a:xfrm>
             <a:off x="829440" y="2234520"/>
-            <a:ext cx="10208160" cy="2235960"/>
+            <a:ext cx="10207440" cy="2235240"/>
           </a:xfrm>
           <a:prstGeom prst="rect">
             <a:avLst/>
@@ -5336,7 +5337,7 @@
         <p:spPr>
           <a:xfrm>
             <a:off x="519120" y="228600"/>
-            <a:ext cx="11145960" cy="744840"/>
+            <a:ext cx="11145240" cy="744120"/>
           </a:xfrm>
           <a:prstGeom prst="rect">
             <a:avLst/>
@@ -5361,7 +5362,7 @@
               </a:lnSpc>
             </a:pPr>
             <a:r>
-              <a:rPr b="0" lang="en-US" sz="5400" spc="-77" strike="noStrike">
+              <a:rPr b="0" lang="en-US" sz="5400" spc="-72" strike="noStrike">
                 <a:solidFill>
                   <a:srgbClr val="595959"/>
                 </a:solidFill>
@@ -5402,7 +5403,7 @@
         <p:spPr>
           <a:xfrm>
             <a:off x="805320" y="1487520"/>
-            <a:ext cx="10256040" cy="4521960"/>
+            <a:ext cx="10255320" cy="4521240"/>
           </a:xfrm>
           <a:prstGeom prst="rect">
             <a:avLst/>
@@ -5470,7 +5471,7 @@
         <p:spPr>
           <a:xfrm>
             <a:off x="519120" y="228600"/>
-            <a:ext cx="11145960" cy="744840"/>
+            <a:ext cx="11145240" cy="744120"/>
           </a:xfrm>
           <a:prstGeom prst="rect">
             <a:avLst/>
@@ -5495,7 +5496,7 @@
               </a:lnSpc>
             </a:pPr>
             <a:r>
-              <a:rPr b="0" lang="en-US" sz="5400" spc="-77" strike="noStrike">
+              <a:rPr b="0" lang="en-US" sz="5400" spc="-72" strike="noStrike">
                 <a:solidFill>
                   <a:srgbClr val="595959"/>
                 </a:solidFill>
@@ -5536,7 +5537,7 @@
         <p:spPr>
           <a:xfrm>
             <a:off x="954360" y="1506600"/>
-            <a:ext cx="10246320" cy="4483800"/>
+            <a:ext cx="10245600" cy="4483080"/>
           </a:xfrm>
           <a:prstGeom prst="rect">
             <a:avLst/>
@@ -5604,7 +5605,7 @@
         <p:spPr>
           <a:xfrm>
             <a:off x="519120" y="228600"/>
-            <a:ext cx="11145960" cy="744840"/>
+            <a:ext cx="11145240" cy="744120"/>
           </a:xfrm>
           <a:prstGeom prst="rect">
             <a:avLst/>
@@ -5629,7 +5630,7 @@
               </a:lnSpc>
             </a:pPr>
             <a:r>
-              <a:rPr b="0" lang="en-US" sz="5400" spc="-77" strike="noStrike">
+              <a:rPr b="0" lang="en-US" sz="5400" spc="-72" strike="noStrike">
                 <a:solidFill>
                   <a:srgbClr val="595959"/>
                 </a:solidFill>
@@ -5670,7 +5671,7 @@
         <p:spPr>
           <a:xfrm>
             <a:off x="1062360" y="1456560"/>
-            <a:ext cx="10246320" cy="4512240"/>
+            <a:ext cx="10245600" cy="4511520"/>
           </a:xfrm>
           <a:prstGeom prst="rect">
             <a:avLst/>
@@ -5738,7 +5739,7 @@
         <p:spPr>
           <a:xfrm>
             <a:off x="519120" y="228600"/>
-            <a:ext cx="11145960" cy="744840"/>
+            <a:ext cx="11145240" cy="744120"/>
           </a:xfrm>
           <a:prstGeom prst="rect">
             <a:avLst/>
@@ -5763,7 +5764,7 @@
               </a:lnSpc>
             </a:pPr>
             <a:r>
-              <a:rPr b="0" lang="en-US" sz="5400" spc="-77" strike="noStrike">
+              <a:rPr b="0" lang="en-US" sz="5400" spc="-72" strike="noStrike">
                 <a:solidFill>
                   <a:srgbClr val="595959"/>
                 </a:solidFill>
@@ -5804,7 +5805,7 @@
         <p:spPr>
           <a:xfrm>
             <a:off x="819720" y="1497240"/>
-            <a:ext cx="10227240" cy="4502880"/>
+            <a:ext cx="10226520" cy="4502160"/>
           </a:xfrm>
           <a:prstGeom prst="rect">
             <a:avLst/>
@@ -5872,7 +5873,7 @@
         <p:spPr>
           <a:xfrm>
             <a:off x="519120" y="228600"/>
-            <a:ext cx="11145960" cy="744840"/>
+            <a:ext cx="11145240" cy="744120"/>
           </a:xfrm>
           <a:prstGeom prst="rect">
             <a:avLst/>
@@ -5897,7 +5898,7 @@
               </a:lnSpc>
             </a:pPr>
             <a:r>
-              <a:rPr b="0" lang="en-US" sz="5400" spc="-77" strike="noStrike">
+              <a:rPr b="0" lang="en-US" sz="5400" spc="-72" strike="noStrike">
                 <a:solidFill>
                   <a:srgbClr val="595959"/>
                 </a:solidFill>
@@ -5934,7 +5935,7 @@
         <p:spPr>
           <a:xfrm>
             <a:off x="544320" y="1351080"/>
-            <a:ext cx="11145960" cy="2040840"/>
+            <a:ext cx="11145240" cy="2040120"/>
           </a:xfrm>
           <a:prstGeom prst="rect">
             <a:avLst/>
@@ -5953,7 +5954,7 @@
         <p:txBody>
           <a:bodyPr lIns="0" rIns="0" tIns="0" bIns="0"/>
           <a:p>
-            <a:pPr marL="284040" indent="-281160">
+            <a:pPr marL="284040" indent="-280440">
               <a:lnSpc>
                 <a:spcPct val="100000"/>
               </a:lnSpc>
@@ -5968,7 +5969,7 @@
               <a:buChar char=""/>
             </a:pPr>
             <a:r>
-              <a:rPr b="0" lang="en-US" sz="3200" spc="-49" strike="noStrike">
+              <a:rPr b="0" lang="en-US" sz="3200" spc="-43" strike="noStrike">
                 <a:solidFill>
                   <a:srgbClr val="797a7d"/>
                 </a:solidFill>
@@ -5995,7 +5996,7 @@
             </a:endParaRPr>
           </a:p>
           <a:p>
-            <a:pPr marL="284040" indent="-281160">
+            <a:pPr marL="284040" indent="-280440">
               <a:lnSpc>
                 <a:spcPct val="100000"/>
               </a:lnSpc>
@@ -6010,7 +6011,7 @@
               <a:buChar char=""/>
             </a:pPr>
             <a:r>
-              <a:rPr b="0" lang="en-US" sz="3200" spc="-49" strike="noStrike">
+              <a:rPr b="0" lang="en-US" sz="3200" spc="-43" strike="noStrike">
                 <a:solidFill>
                   <a:srgbClr val="797a7d"/>
                 </a:solidFill>
@@ -6037,7 +6038,7 @@
             </a:endParaRPr>
           </a:p>
           <a:p>
-            <a:pPr marL="284040" indent="-281160">
+            <a:pPr marL="284040" indent="-280440">
               <a:lnSpc>
                 <a:spcPct val="100000"/>
               </a:lnSpc>
@@ -6052,7 +6053,7 @@
               <a:buChar char=""/>
             </a:pPr>
             <a:r>
-              <a:rPr b="0" lang="en-US" sz="3200" spc="-49" strike="noStrike">
+              <a:rPr b="0" lang="en-US" sz="3200" spc="-43" strike="noStrike">
                 <a:solidFill>
                   <a:srgbClr val="797a7d"/>
                 </a:solidFill>
@@ -6079,7 +6080,7 @@
             </a:endParaRPr>
           </a:p>
           <a:p>
-            <a:pPr marL="284040" indent="-281160">
+            <a:pPr marL="284040" indent="-280440">
               <a:lnSpc>
                 <a:spcPct val="100000"/>
               </a:lnSpc>
@@ -6094,7 +6095,7 @@
               <a:buChar char=""/>
             </a:pPr>
             <a:r>
-              <a:rPr b="0" lang="en-US" sz="3200" spc="-49" strike="noStrike">
+              <a:rPr b="0" lang="en-US" sz="3200" spc="-43" strike="noStrike">
                 <a:solidFill>
                   <a:srgbClr val="797a7d"/>
                 </a:solidFill>
@@ -6121,7 +6122,7 @@
             </a:endParaRPr>
           </a:p>
           <a:p>
-            <a:pPr marL="284040" indent="-281160">
+            <a:pPr marL="284040" indent="-280440">
               <a:lnSpc>
                 <a:spcPct val="100000"/>
               </a:lnSpc>
@@ -6136,7 +6137,7 @@
               <a:buChar char=""/>
             </a:pPr>
             <a:r>
-              <a:rPr b="0" lang="en-US" sz="3200" spc="-49" strike="noStrike">
+              <a:rPr b="0" lang="en-US" sz="3200" spc="-43" strike="noStrike">
                 <a:solidFill>
                   <a:srgbClr val="797a7d"/>
                 </a:solidFill>
@@ -6163,7 +6164,7 @@
             </a:endParaRPr>
           </a:p>
           <a:p>
-            <a:pPr marL="284040" indent="-281160">
+            <a:pPr marL="284040" indent="-280440">
               <a:lnSpc>
                 <a:spcPct val="100000"/>
               </a:lnSpc>
@@ -6178,7 +6179,7 @@
               <a:buChar char=""/>
             </a:pPr>
             <a:r>
-              <a:rPr b="0" lang="en-US" sz="3200" spc="-49" strike="noStrike">
+              <a:rPr b="0" lang="en-US" sz="3200" spc="-43" strike="noStrike">
                 <a:solidFill>
                   <a:srgbClr val="797a7d"/>
                 </a:solidFill>
@@ -6205,7 +6206,7 @@
             </a:endParaRPr>
           </a:p>
           <a:p>
-            <a:pPr marL="284040" indent="-281160">
+            <a:pPr marL="284040" indent="-280440">
               <a:lnSpc>
                 <a:spcPct val="100000"/>
               </a:lnSpc>
@@ -6220,7 +6221,7 @@
               <a:buChar char=""/>
             </a:pPr>
             <a:r>
-              <a:rPr b="0" lang="en-US" sz="3200" spc="-49" strike="noStrike">
+              <a:rPr b="0" lang="en-US" sz="3200" spc="-43" strike="noStrike">
                 <a:solidFill>
                   <a:srgbClr val="797a7d"/>
                 </a:solidFill>
@@ -6247,7 +6248,7 @@
             </a:endParaRPr>
           </a:p>
           <a:p>
-            <a:pPr marL="284040" indent="-281160">
+            <a:pPr marL="284040" indent="-280440">
               <a:lnSpc>
                 <a:spcPct val="100000"/>
               </a:lnSpc>
@@ -6262,7 +6263,7 @@
               <a:buChar char=""/>
             </a:pPr>
             <a:r>
-              <a:rPr b="0" lang="en-US" sz="3200" spc="-49" strike="noStrike">
+              <a:rPr b="0" lang="en-US" sz="3200" spc="-43" strike="noStrike">
                 <a:solidFill>
                   <a:srgbClr val="797a7d"/>
                 </a:solidFill>
@@ -6289,7 +6290,7 @@
             </a:endParaRPr>
           </a:p>
           <a:p>
-            <a:pPr marL="284040" indent="-281160">
+            <a:pPr marL="284040" indent="-280440">
               <a:lnSpc>
                 <a:spcPct val="100000"/>
               </a:lnSpc>
@@ -6304,7 +6305,7 @@
               <a:buChar char=""/>
             </a:pPr>
             <a:r>
-              <a:rPr b="0" lang="en-US" sz="3200" spc="-49" strike="noStrike">
+              <a:rPr b="0" lang="en-US" sz="3200" spc="-43" strike="noStrike">
                 <a:solidFill>
                   <a:srgbClr val="797a7d"/>
                 </a:solidFill>
@@ -6390,7 +6391,7 @@
         <p:spPr>
           <a:xfrm>
             <a:off x="519120" y="228600"/>
-            <a:ext cx="11145960" cy="744840"/>
+            <a:ext cx="11145240" cy="744120"/>
           </a:xfrm>
           <a:prstGeom prst="rect">
             <a:avLst/>
@@ -6415,7 +6416,7 @@
               </a:lnSpc>
             </a:pPr>
             <a:r>
-              <a:rPr b="0" lang="en-US" sz="5400" spc="-77" strike="noStrike">
+              <a:rPr b="0" lang="en-US" sz="5400" spc="-72" strike="noStrike">
                 <a:solidFill>
                   <a:srgbClr val="595959"/>
                 </a:solidFill>
@@ -7565,7 +7566,7 @@
         <p:spPr>
           <a:xfrm>
             <a:off x="519120" y="228600"/>
-            <a:ext cx="11145960" cy="744840"/>
+            <a:ext cx="11145240" cy="744120"/>
           </a:xfrm>
           <a:prstGeom prst="rect">
             <a:avLst/>
@@ -7590,7 +7591,7 @@
               </a:lnSpc>
             </a:pPr>
             <a:r>
-              <a:rPr b="0" lang="en-US" sz="5400" spc="-77" strike="noStrike">
+              <a:rPr b="0" lang="en-US" sz="5400" spc="-72" strike="noStrike">
                 <a:solidFill>
                   <a:srgbClr val="595959"/>
                 </a:solidFill>
@@ -7631,7 +7632,7 @@
         <p:spPr>
           <a:xfrm>
             <a:off x="2286000" y="1983240"/>
-            <a:ext cx="2649600" cy="594360"/>
+            <a:ext cx="2648880" cy="593640"/>
           </a:xfrm>
           <a:prstGeom prst="rect">
             <a:avLst/>
@@ -7654,7 +7655,7 @@
         <p:spPr>
           <a:xfrm>
             <a:off x="8642880" y="3264120"/>
-            <a:ext cx="1315080" cy="1735200"/>
+            <a:ext cx="1314360" cy="1734480"/>
           </a:xfrm>
           <a:prstGeom prst="rect">
             <a:avLst/>
@@ -7677,7 +7678,7 @@
         <p:spPr>
           <a:xfrm>
             <a:off x="5120640" y="1800360"/>
-            <a:ext cx="3198240" cy="1027440"/>
+            <a:ext cx="3197520" cy="1026720"/>
           </a:xfrm>
           <a:prstGeom prst="rect">
             <a:avLst/>
@@ -7700,7 +7701,7 @@
         <p:spPr>
           <a:xfrm>
             <a:off x="8513640" y="1932120"/>
-            <a:ext cx="1725480" cy="963360"/>
+            <a:ext cx="1724760" cy="962640"/>
           </a:xfrm>
           <a:prstGeom prst="rect">
             <a:avLst/>
@@ -7723,7 +7724,7 @@
         <p:spPr>
           <a:xfrm>
             <a:off x="2516400" y="3279600"/>
-            <a:ext cx="1950120" cy="988200"/>
+            <a:ext cx="1949400" cy="987480"/>
           </a:xfrm>
           <a:prstGeom prst="rect">
             <a:avLst/>
@@ -7746,7 +7747,7 @@
         <p:spPr>
           <a:xfrm>
             <a:off x="4985280" y="3812760"/>
-            <a:ext cx="2812320" cy="455040"/>
+            <a:ext cx="2811600" cy="454320"/>
           </a:xfrm>
           <a:prstGeom prst="rect">
             <a:avLst/>
@@ -7769,7 +7770,7 @@
         <p:spPr>
           <a:xfrm>
             <a:off x="2500560" y="4783680"/>
-            <a:ext cx="3045600" cy="426240"/>
+            <a:ext cx="3044880" cy="425520"/>
           </a:xfrm>
           <a:prstGeom prst="rect">
             <a:avLst/>
@@ -7837,7 +7838,7 @@
         <p:spPr>
           <a:xfrm>
             <a:off x="519120" y="228600"/>
-            <a:ext cx="11145960" cy="744840"/>
+            <a:ext cx="11145240" cy="744120"/>
           </a:xfrm>
           <a:prstGeom prst="rect">
             <a:avLst/>
@@ -7862,7 +7863,7 @@
               </a:lnSpc>
             </a:pPr>
             <a:r>
-              <a:rPr b="0" lang="en-US" sz="5400" spc="-77" strike="noStrike">
+              <a:rPr b="0" lang="en-US" sz="5400" spc="-72" strike="noStrike">
                 <a:solidFill>
                   <a:srgbClr val="595959"/>
                 </a:solidFill>
@@ -7899,7 +7900,7 @@
         <p:spPr>
           <a:xfrm>
             <a:off x="519120" y="1447920"/>
-            <a:ext cx="11145960" cy="2040840"/>
+            <a:ext cx="11145240" cy="2040120"/>
           </a:xfrm>
           <a:prstGeom prst="rect">
             <a:avLst/>
@@ -7918,7 +7919,7 @@
         <p:txBody>
           <a:bodyPr lIns="0" rIns="0" tIns="0" bIns="0"/>
           <a:p>
-            <a:pPr marL="284040" indent="-281160">
+            <a:pPr marL="284040" indent="-280440">
               <a:lnSpc>
                 <a:spcPct val="100000"/>
               </a:lnSpc>
@@ -7933,7 +7934,7 @@
               <a:buChar char=""/>
             </a:pPr>
             <a:r>
-              <a:rPr b="0" lang="en-US" sz="3200" spc="-49" strike="noStrike">
+              <a:rPr b="0" lang="en-US" sz="3200" spc="-43" strike="noStrike">
                 <a:solidFill>
                   <a:srgbClr val="797a7d"/>
                 </a:solidFill>
@@ -7960,7 +7961,7 @@
             </a:endParaRPr>
           </a:p>
           <a:p>
-            <a:pPr marL="284040" indent="-281160">
+            <a:pPr marL="284040" indent="-280440">
               <a:lnSpc>
                 <a:spcPct val="100000"/>
               </a:lnSpc>
@@ -7975,7 +7976,7 @@
               <a:buChar char=""/>
             </a:pPr>
             <a:r>
-              <a:rPr b="0" lang="en-US" sz="3200" spc="-49" strike="noStrike">
+              <a:rPr b="0" lang="en-US" sz="3200" spc="-43" strike="noStrike">
                 <a:solidFill>
                   <a:srgbClr val="797a7d"/>
                 </a:solidFill>
@@ -8002,7 +8003,7 @@
             </a:endParaRPr>
           </a:p>
           <a:p>
-            <a:pPr marL="284040" indent="-281160">
+            <a:pPr marL="284040" indent="-280440">
               <a:lnSpc>
                 <a:spcPct val="100000"/>
               </a:lnSpc>
@@ -8017,7 +8018,7 @@
               <a:buChar char=""/>
             </a:pPr>
             <a:r>
-              <a:rPr b="0" lang="en-US" sz="3200" spc="-49" strike="noStrike">
+              <a:rPr b="0" lang="en-US" sz="3200" spc="-43" strike="noStrike">
                 <a:solidFill>
                   <a:srgbClr val="797a7d"/>
                 </a:solidFill>
@@ -8044,7 +8045,7 @@
             </a:endParaRPr>
           </a:p>
           <a:p>
-            <a:pPr marL="284040" indent="-281160">
+            <a:pPr marL="284040" indent="-280440">
               <a:lnSpc>
                 <a:spcPct val="100000"/>
               </a:lnSpc>
@@ -8059,7 +8060,7 @@
               <a:buChar char=""/>
             </a:pPr>
             <a:r>
-              <a:rPr b="0" lang="en-US" sz="3200" spc="-49" strike="noStrike">
+              <a:rPr b="0" lang="en-US" sz="3200" spc="-43" strike="noStrike">
                 <a:solidFill>
                   <a:srgbClr val="797a7d"/>
                 </a:solidFill>
@@ -8145,7 +8146,7 @@
         <p:spPr>
           <a:xfrm>
             <a:off x="519120" y="228600"/>
-            <a:ext cx="11145960" cy="744840"/>
+            <a:ext cx="11145240" cy="744120"/>
           </a:xfrm>
           <a:prstGeom prst="rect">
             <a:avLst/>
@@ -8170,7 +8171,7 @@
               </a:lnSpc>
             </a:pPr>
             <a:r>
-              <a:rPr b="0" lang="en-US" sz="5400" spc="-77" strike="noStrike">
+              <a:rPr b="0" lang="en-US" sz="5400" spc="-72" strike="noStrike">
                 <a:solidFill>
                   <a:srgbClr val="595959"/>
                 </a:solidFill>
@@ -8207,7 +8208,7 @@
         <p:spPr>
           <a:xfrm>
             <a:off x="544320" y="1581840"/>
-            <a:ext cx="11145960" cy="2040840"/>
+            <a:ext cx="11145240" cy="2040120"/>
           </a:xfrm>
           <a:prstGeom prst="rect">
             <a:avLst/>
@@ -8226,7 +8227,7 @@
         <p:txBody>
           <a:bodyPr lIns="0" rIns="0" tIns="0" bIns="0"/>
           <a:p>
-            <a:pPr marL="284040" indent="-281160">
+            <a:pPr marL="284040" indent="-280440">
               <a:lnSpc>
                 <a:spcPct val="100000"/>
               </a:lnSpc>
@@ -8241,7 +8242,7 @@
               <a:buChar char=""/>
             </a:pPr>
             <a:r>
-              <a:rPr b="0" lang="en-US" sz="3200" spc="-49" strike="noStrike">
+              <a:rPr b="0" lang="en-US" sz="3200" spc="-43" strike="noStrike">
                 <a:solidFill>
                   <a:srgbClr val="797a7d"/>
                 </a:solidFill>
@@ -8268,7 +8269,7 @@
             </a:endParaRPr>
           </a:p>
           <a:p>
-            <a:pPr marL="284040" indent="-281160">
+            <a:pPr marL="284040" indent="-280440">
               <a:lnSpc>
                 <a:spcPct val="100000"/>
               </a:lnSpc>
@@ -8283,7 +8284,7 @@
               <a:buChar char=""/>
             </a:pPr>
             <a:r>
-              <a:rPr b="0" lang="en-US" sz="3200" spc="-49" strike="noStrike">
+              <a:rPr b="0" lang="en-US" sz="3200" spc="-43" strike="noStrike">
                 <a:solidFill>
                   <a:srgbClr val="797a7d"/>
                 </a:solidFill>
@@ -8310,7 +8311,7 @@
             </a:endParaRPr>
           </a:p>
           <a:p>
-            <a:pPr marL="284040" indent="-281160">
+            <a:pPr marL="284040" indent="-280440">
               <a:lnSpc>
                 <a:spcPct val="100000"/>
               </a:lnSpc>
@@ -8325,7 +8326,7 @@
               <a:buChar char=""/>
             </a:pPr>
             <a:r>
-              <a:rPr b="0" lang="en-US" sz="3200" spc="-49" strike="noStrike">
+              <a:rPr b="0" lang="en-US" sz="3200" spc="-43" strike="noStrike">
                 <a:solidFill>
                   <a:srgbClr val="797a7d"/>
                 </a:solidFill>
@@ -8352,7 +8353,7 @@
             </a:endParaRPr>
           </a:p>
           <a:p>
-            <a:pPr marL="284040" indent="-281160">
+            <a:pPr marL="284040" indent="-280440">
               <a:lnSpc>
                 <a:spcPct val="100000"/>
               </a:lnSpc>
@@ -8367,7 +8368,7 @@
               <a:buChar char=""/>
             </a:pPr>
             <a:r>
-              <a:rPr b="0" lang="en-US" sz="3200" spc="-49" strike="noStrike">
+              <a:rPr b="0" lang="en-US" sz="3200" spc="-43" strike="noStrike">
                 <a:solidFill>
                   <a:srgbClr val="797a7d"/>
                 </a:solidFill>
@@ -8394,7 +8395,7 @@
             </a:endParaRPr>
           </a:p>
           <a:p>
-            <a:pPr marL="284040" indent="-281160">
+            <a:pPr marL="284040" indent="-280440">
               <a:lnSpc>
                 <a:spcPct val="100000"/>
               </a:lnSpc>
@@ -8409,7 +8410,7 @@
               <a:buChar char=""/>
             </a:pPr>
             <a:r>
-              <a:rPr b="0" lang="en-US" sz="3200" spc="-49" strike="noStrike">
+              <a:rPr b="0" lang="en-US" sz="3200" spc="-43" strike="noStrike">
                 <a:solidFill>
                   <a:srgbClr val="797a7d"/>
                 </a:solidFill>
@@ -8495,7 +8496,7 @@
         <p:spPr>
           <a:xfrm>
             <a:off x="519120" y="228600"/>
-            <a:ext cx="11145960" cy="744840"/>
+            <a:ext cx="11145240" cy="744120"/>
           </a:xfrm>
           <a:prstGeom prst="rect">
             <a:avLst/>
@@ -8520,7 +8521,7 @@
               </a:lnSpc>
             </a:pPr>
             <a:r>
-              <a:rPr b="0" lang="en-US" sz="5400" spc="-77" strike="noStrike">
+              <a:rPr b="0" lang="en-US" sz="5400" spc="-72" strike="noStrike">
                 <a:solidFill>
                   <a:srgbClr val="595959"/>
                 </a:solidFill>
@@ -8557,7 +8558,7 @@
         <p:spPr>
           <a:xfrm>
             <a:off x="519120" y="1447920"/>
-            <a:ext cx="11145960" cy="2040840"/>
+            <a:ext cx="11145240" cy="2040120"/>
           </a:xfrm>
           <a:prstGeom prst="rect">
             <a:avLst/>
@@ -8576,7 +8577,7 @@
         <p:txBody>
           <a:bodyPr lIns="0" rIns="0" tIns="0" bIns="0"/>
           <a:p>
-            <a:pPr marL="284040" indent="-281160">
+            <a:pPr marL="284040" indent="-280440">
               <a:lnSpc>
                 <a:spcPct val="100000"/>
               </a:lnSpc>
@@ -8591,7 +8592,7 @@
               <a:buChar char=""/>
             </a:pPr>
             <a:r>
-              <a:rPr b="0" lang="en-US" sz="3200" spc="-49" strike="noStrike">
+              <a:rPr b="0" lang="en-US" sz="3200" spc="-43" strike="noStrike">
                 <a:solidFill>
                   <a:srgbClr val="797a7d"/>
                 </a:solidFill>
@@ -8618,7 +8619,7 @@
             </a:endParaRPr>
           </a:p>
           <a:p>
-            <a:pPr marL="284040" indent="-281160">
+            <a:pPr marL="284040" indent="-280440">
               <a:lnSpc>
                 <a:spcPct val="100000"/>
               </a:lnSpc>
@@ -8633,7 +8634,7 @@
               <a:buChar char=""/>
             </a:pPr>
             <a:r>
-              <a:rPr b="0" lang="en-US" sz="3200" spc="-49" strike="noStrike">
+              <a:rPr b="0" lang="en-US" sz="3200" spc="-43" strike="noStrike">
                 <a:solidFill>
                   <a:srgbClr val="797a7d"/>
                 </a:solidFill>
@@ -8660,7 +8661,7 @@
             </a:endParaRPr>
           </a:p>
           <a:p>
-            <a:pPr marL="284040" indent="-281160">
+            <a:pPr marL="284040" indent="-280440">
               <a:lnSpc>
                 <a:spcPct val="100000"/>
               </a:lnSpc>
@@ -8675,7 +8676,7 @@
               <a:buChar char=""/>
             </a:pPr>
             <a:r>
-              <a:rPr b="0" lang="en-US" sz="3200" spc="-49" strike="noStrike">
+              <a:rPr b="0" lang="en-US" sz="3200" spc="-43" strike="noStrike">
                 <a:solidFill>
                   <a:srgbClr val="797a7d"/>
                 </a:solidFill>
@@ -8702,7 +8703,7 @@
             </a:endParaRPr>
           </a:p>
           <a:p>
-            <a:pPr marL="284040" indent="-281160">
+            <a:pPr marL="284040" indent="-280440">
               <a:lnSpc>
                 <a:spcPct val="100000"/>
               </a:lnSpc>
@@ -8717,7 +8718,7 @@
               <a:buChar char=""/>
             </a:pPr>
             <a:r>
-              <a:rPr b="0" lang="en-US" sz="3200" spc="-49" strike="noStrike">
+              <a:rPr b="0" lang="en-US" sz="3200" spc="-43" strike="noStrike">
                 <a:solidFill>
                   <a:srgbClr val="797a7d"/>
                 </a:solidFill>
@@ -8744,7 +8745,7 @@
             </a:endParaRPr>
           </a:p>
           <a:p>
-            <a:pPr marL="284040" indent="-281160">
+            <a:pPr marL="284040" indent="-280440">
               <a:lnSpc>
                 <a:spcPct val="100000"/>
               </a:lnSpc>
@@ -8759,7 +8760,7 @@
               <a:buChar char=""/>
             </a:pPr>
             <a:r>
-              <a:rPr b="0" lang="en-US" sz="3200" spc="-49" strike="noStrike">
+              <a:rPr b="0" lang="en-US" sz="3200" spc="-43" strike="noStrike">
                 <a:solidFill>
                   <a:srgbClr val="797a7d"/>
                 </a:solidFill>
@@ -8786,7 +8787,7 @@
             </a:endParaRPr>
           </a:p>
           <a:p>
-            <a:pPr marL="284040" indent="-281160">
+            <a:pPr marL="284040" indent="-280440">
               <a:lnSpc>
                 <a:spcPct val="100000"/>
               </a:lnSpc>
@@ -8801,7 +8802,7 @@
               <a:buChar char=""/>
             </a:pPr>
             <a:r>
-              <a:rPr b="0" lang="en-US" sz="3200" spc="-49" strike="noStrike">
+              <a:rPr b="0" lang="en-US" sz="3200" spc="-43" strike="noStrike">
                 <a:solidFill>
                   <a:srgbClr val="797a7d"/>
                 </a:solidFill>
@@ -8887,7 +8888,7 @@
         <p:spPr>
           <a:xfrm>
             <a:off x="519120" y="228600"/>
-            <a:ext cx="11145960" cy="744840"/>
+            <a:ext cx="11145240" cy="744120"/>
           </a:xfrm>
           <a:prstGeom prst="rect">
             <a:avLst/>
@@ -8912,7 +8913,7 @@
               </a:lnSpc>
             </a:pPr>
             <a:r>
-              <a:rPr b="0" lang="en-US" sz="5400" spc="-77" strike="noStrike">
+              <a:rPr b="0" lang="en-US" sz="5400" spc="-72" strike="noStrike">
                 <a:solidFill>
                   <a:srgbClr val="595959"/>
                 </a:solidFill>
@@ -8953,7 +8954,7 @@
         <p:spPr>
           <a:xfrm>
             <a:off x="640080" y="1097280"/>
-            <a:ext cx="8358840" cy="5672520"/>
+            <a:ext cx="8358120" cy="5671800"/>
           </a:xfrm>
           <a:prstGeom prst="rect">
             <a:avLst/>
@@ -9021,7 +9022,7 @@
         <p:spPr>
           <a:xfrm>
             <a:off x="978840" y="2109600"/>
-            <a:ext cx="10234800" cy="994320"/>
+            <a:ext cx="10234080" cy="993600"/>
           </a:xfrm>
           <a:prstGeom prst="rect">
             <a:avLst/>
@@ -9046,7 +9047,7 @@
               </a:lnSpc>
             </a:pPr>
             <a:r>
-              <a:rPr b="0" lang="en-US" sz="7200" spc="-128" strike="noStrike">
+              <a:rPr b="0" lang="en-US" sz="7200" spc="-123" strike="noStrike">
                 <a:solidFill>
                   <a:srgbClr val="595959"/>
                 </a:solidFill>
@@ -9132,7 +9133,7 @@
         <p:spPr>
           <a:xfrm>
             <a:off x="519120" y="228600"/>
-            <a:ext cx="11145960" cy="744840"/>
+            <a:ext cx="11145240" cy="744120"/>
           </a:xfrm>
           <a:prstGeom prst="rect">
             <a:avLst/>
@@ -9157,7 +9158,7 @@
               </a:lnSpc>
             </a:pPr>
             <a:r>
-              <a:rPr b="0" lang="en-US" sz="5400" spc="-77" strike="noStrike">
+              <a:rPr b="0" lang="en-US" sz="5400" spc="-72" strike="noStrike">
                 <a:solidFill>
                   <a:srgbClr val="595959"/>
                 </a:solidFill>
@@ -9194,7 +9195,7 @@
         <p:spPr>
           <a:xfrm>
             <a:off x="519120" y="1447920"/>
-            <a:ext cx="11145960" cy="2040840"/>
+            <a:ext cx="11145240" cy="2040120"/>
           </a:xfrm>
           <a:prstGeom prst="rect">
             <a:avLst/>
@@ -9213,7 +9214,7 @@
         <p:txBody>
           <a:bodyPr lIns="0" rIns="0" tIns="0" bIns="0"/>
           <a:p>
-            <a:pPr marL="284040" indent="-281160">
+            <a:pPr marL="284040" indent="-280440">
               <a:lnSpc>
                 <a:spcPct val="100000"/>
               </a:lnSpc>
@@ -9228,7 +9229,7 @@
               <a:buChar char=""/>
             </a:pPr>
             <a:r>
-              <a:rPr b="0" lang="en-US" sz="3200" spc="-49" strike="noStrike">
+              <a:rPr b="0" lang="en-US" sz="3200" spc="-43" strike="noStrike">
                 <a:solidFill>
                   <a:srgbClr val="797a7d"/>
                 </a:solidFill>
@@ -9255,7 +9256,7 @@
             </a:endParaRPr>
           </a:p>
           <a:p>
-            <a:pPr marL="284040" indent="-281160">
+            <a:pPr marL="284040" indent="-280440">
               <a:lnSpc>
                 <a:spcPct val="100000"/>
               </a:lnSpc>
@@ -9270,7 +9271,7 @@
               <a:buChar char=""/>
             </a:pPr>
             <a:r>
-              <a:rPr b="0" lang="en-US" sz="3200" spc="-49" strike="noStrike">
+              <a:rPr b="0" lang="en-US" sz="3200" spc="-43" strike="noStrike">
                 <a:solidFill>
                   <a:srgbClr val="797a7d"/>
                 </a:solidFill>
@@ -9282,7 +9283,7 @@
                 <a:latin typeface="Segoe UI Light"/>
                 <a:ea typeface="DejaVu Sans"/>
               </a:rPr>
-              <a:t>1 VM: CPU 4 cores, RAM 12 GB, HDD 128GB, NIC 2</a:t>
+              <a:t>1 VM: CPU 8 cores, RAM 16 GB, HDD 128GB, NIC 2</a:t>
             </a:r>
             <a:endParaRPr b="0" lang="en-US" sz="3200" spc="-1" strike="noStrike">
               <a:solidFill>
@@ -9297,7 +9298,7 @@
             </a:endParaRPr>
           </a:p>
           <a:p>
-            <a:pPr marL="284040" indent="-281160">
+            <a:pPr marL="284040" indent="-280440">
               <a:lnSpc>
                 <a:spcPct val="100000"/>
               </a:lnSpc>
@@ -9312,7 +9313,7 @@
               <a:buChar char=""/>
             </a:pPr>
             <a:r>
-              <a:rPr b="0" lang="en-US" sz="3200" spc="-49" strike="noStrike">
+              <a:rPr b="0" lang="en-US" sz="3200" spc="-43" strike="noStrike">
                 <a:solidFill>
                   <a:srgbClr val="797a7d"/>
                 </a:solidFill>
@@ -9339,7 +9340,7 @@
             </a:endParaRPr>
           </a:p>
           <a:p>
-            <a:pPr marL="284040" indent="-281160">
+            <a:pPr marL="284040" indent="-280440">
               <a:lnSpc>
                 <a:spcPct val="100000"/>
               </a:lnSpc>
@@ -9354,7 +9355,7 @@
               <a:buChar char=""/>
             </a:pPr>
             <a:r>
-              <a:rPr b="0" lang="en-US" sz="3200" spc="-49" strike="noStrike">
+              <a:rPr b="0" lang="en-US" sz="3200" spc="-43" strike="noStrike">
                 <a:solidFill>
                   <a:srgbClr val="797a7d"/>
                 </a:solidFill>
@@ -9381,7 +9382,7 @@
             </a:endParaRPr>
           </a:p>
           <a:p>
-            <a:pPr marL="284040" indent="-281160">
+            <a:pPr marL="284040" indent="-280440">
               <a:lnSpc>
                 <a:spcPct val="100000"/>
               </a:lnSpc>
@@ -9396,7 +9397,7 @@
               <a:buChar char=""/>
             </a:pPr>
             <a:r>
-              <a:rPr b="0" lang="en-US" sz="3200" spc="-49" strike="noStrike">
+              <a:rPr b="0" lang="en-US" sz="3200" spc="-43" strike="noStrike">
                 <a:solidFill>
                   <a:srgbClr val="797a7d"/>
                 </a:solidFill>
@@ -9482,7 +9483,7 @@
         <p:spPr>
           <a:xfrm>
             <a:off x="519120" y="228600"/>
-            <a:ext cx="11145960" cy="744840"/>
+            <a:ext cx="11145240" cy="744120"/>
           </a:xfrm>
           <a:prstGeom prst="rect">
             <a:avLst/>
@@ -9507,7 +9508,7 @@
               </a:lnSpc>
             </a:pPr>
             <a:r>
-              <a:rPr b="0" lang="en-US" sz="5400" spc="-77" strike="noStrike">
+              <a:rPr b="0" lang="en-US" sz="5400" spc="-72" strike="noStrike">
                 <a:solidFill>
                   <a:srgbClr val="595959"/>
                 </a:solidFill>
@@ -9548,7 +9549,7 @@
         <p:spPr>
           <a:xfrm>
             <a:off x="952200" y="3834360"/>
-            <a:ext cx="1283400" cy="959400"/>
+            <a:ext cx="1282680" cy="958680"/>
           </a:xfrm>
           <a:prstGeom prst="rect">
             <a:avLst/>
@@ -9739,7 +9740,7 @@
         <p:spPr>
           <a:xfrm>
             <a:off x="7543800" y="1132920"/>
-            <a:ext cx="1552320" cy="1552320"/>
+            <a:ext cx="1551600" cy="1551600"/>
           </a:xfrm>
           <a:prstGeom prst="rect">
             <a:avLst/>
@@ -9758,7 +9759,7 @@
         <p:spPr>
           <a:xfrm>
             <a:off x="7739280" y="1746720"/>
-            <a:ext cx="1144800" cy="316800"/>
+            <a:ext cx="1144080" cy="316080"/>
           </a:xfrm>
           <a:prstGeom prst="rect">
             <a:avLst/>
@@ -9820,7 +9821,7 @@
         <p:spPr>
           <a:xfrm>
             <a:off x="2154600" y="2789640"/>
-            <a:ext cx="2003760" cy="445320"/>
+            <a:ext cx="2003040" cy="444600"/>
           </a:xfrm>
           <a:prstGeom prst="rect">
             <a:avLst/>
@@ -9915,7 +9916,7 @@
         <p:spPr>
           <a:xfrm>
             <a:off x="4890960" y="2329920"/>
-            <a:ext cx="857880" cy="445320"/>
+            <a:ext cx="857160" cy="444600"/>
           </a:xfrm>
           <a:prstGeom prst="rect">
             <a:avLst/>
@@ -10010,7 +10011,7 @@
         <p:spPr>
           <a:xfrm>
             <a:off x="1510920" y="3319920"/>
-            <a:ext cx="1095120" cy="623880"/>
+            <a:ext cx="1094400" cy="623160"/>
           </a:xfrm>
           <a:prstGeom prst="rect">
             <a:avLst/>
@@ -10138,7 +10139,7 @@
         <p:spPr>
           <a:xfrm>
             <a:off x="1470600" y="5368320"/>
-            <a:ext cx="3092400" cy="981000"/>
+            <a:ext cx="3091680" cy="980280"/>
           </a:xfrm>
           <a:prstGeom prst="rect">
             <a:avLst/>
@@ -10157,7 +10158,7 @@
         <p:txBody>
           <a:bodyPr lIns="90000" rIns="90000" tIns="45000" bIns="45000" anchor="ctr"/>
           <a:p>
-            <a:pPr marL="90000" indent="-87840">
+            <a:pPr marL="90000" indent="-87120">
               <a:lnSpc>
                 <a:spcPct val="100000"/>
               </a:lnSpc>
@@ -10196,7 +10197,7 @@
             </a:endParaRPr>
           </a:p>
           <a:p>
-            <a:pPr marL="90000" indent="-87840">
+            <a:pPr marL="90000" indent="-87120">
               <a:lnSpc>
                 <a:spcPct val="100000"/>
               </a:lnSpc>
@@ -10235,7 +10236,7 @@
             </a:endParaRPr>
           </a:p>
           <a:p>
-            <a:pPr marL="90000" indent="-87840">
+            <a:pPr marL="90000" indent="-87120">
               <a:lnSpc>
                 <a:spcPct val="100000"/>
               </a:lnSpc>
@@ -10300,7 +10301,7 @@
         <p:spPr>
           <a:xfrm>
             <a:off x="3630600" y="1933920"/>
-            <a:ext cx="856800" cy="445320"/>
+            <a:ext cx="856080" cy="444600"/>
           </a:xfrm>
           <a:prstGeom prst="rect">
             <a:avLst/>
@@ -10395,7 +10396,7 @@
         <p:spPr>
           <a:xfrm>
             <a:off x="5326920" y="1459800"/>
-            <a:ext cx="2387880" cy="651240"/>
+            <a:ext cx="2387160" cy="650520"/>
           </a:xfrm>
           <a:prstGeom prst="rect">
             <a:avLst/>
@@ -10414,7 +10415,7 @@
         <p:txBody>
           <a:bodyPr lIns="90000" rIns="90000" tIns="45000" bIns="45000"/>
           <a:p>
-            <a:pPr marL="90000" indent="-87840">
+            <a:pPr marL="90000" indent="-87120">
               <a:lnSpc>
                 <a:spcPct val="100000"/>
               </a:lnSpc>
@@ -10453,7 +10454,7 @@
             </a:endParaRPr>
           </a:p>
           <a:p>
-            <a:pPr marL="90000" indent="-87840">
+            <a:pPr marL="90000" indent="-87120">
               <a:lnSpc>
                 <a:spcPct val="100000"/>
               </a:lnSpc>
@@ -10502,7 +10503,7 @@
         <p:spPr>
           <a:xfrm>
             <a:off x="2015280" y="3222720"/>
-            <a:ext cx="3266640" cy="1905480"/>
+            <a:ext cx="3265920" cy="1904760"/>
           </a:xfrm>
           <a:prstGeom prst="rect">
             <a:avLst/>
@@ -10823,7 +10824,7 @@
         <p:spPr>
           <a:xfrm>
             <a:off x="1542600" y="4706640"/>
-            <a:ext cx="856800" cy="445320"/>
+            <a:ext cx="856080" cy="444600"/>
           </a:xfrm>
           <a:prstGeom prst="rect">
             <a:avLst/>
@@ -10950,7 +10951,7 @@
         <p:spPr>
           <a:xfrm>
             <a:off x="4380480" y="1392840"/>
-            <a:ext cx="986400" cy="986400"/>
+            <a:ext cx="985680" cy="985680"/>
           </a:xfrm>
           <a:prstGeom prst="rect">
             <a:avLst/>
@@ -11018,7 +11019,7 @@
         <p:spPr>
           <a:xfrm>
             <a:off x="978840" y="2109600"/>
-            <a:ext cx="10234800" cy="994320"/>
+            <a:ext cx="10234080" cy="993600"/>
           </a:xfrm>
           <a:prstGeom prst="rect">
             <a:avLst/>
@@ -11043,7 +11044,7 @@
               </a:lnSpc>
             </a:pPr>
             <a:r>
-              <a:rPr b="0" lang="en-US" sz="7200" spc="-128" strike="noStrike">
+              <a:rPr b="0" lang="en-US" sz="7200" spc="-123" strike="noStrike">
                 <a:solidFill>
                   <a:srgbClr val="595959"/>
                 </a:solidFill>
@@ -11129,7 +11130,7 @@
         <p:spPr>
           <a:xfrm>
             <a:off x="519120" y="228600"/>
-            <a:ext cx="11145960" cy="744840"/>
+            <a:ext cx="11145240" cy="744120"/>
           </a:xfrm>
           <a:prstGeom prst="rect">
             <a:avLst/>
@@ -11154,7 +11155,7 @@
               </a:lnSpc>
             </a:pPr>
             <a:r>
-              <a:rPr b="0" lang="en-US" sz="5400" spc="-77" strike="noStrike">
+              <a:rPr b="0" lang="en-US" sz="5400" spc="-72" strike="noStrike">
                 <a:solidFill>
                   <a:srgbClr val="595959"/>
                 </a:solidFill>
@@ -11195,7 +11196,7 @@
         <p:spPr>
           <a:xfrm>
             <a:off x="2063880" y="1240920"/>
-            <a:ext cx="7760520" cy="5369760"/>
+            <a:ext cx="7759800" cy="5369040"/>
           </a:xfrm>
           <a:prstGeom prst="rect">
             <a:avLst/>
@@ -11263,7 +11264,7 @@
         <p:spPr>
           <a:xfrm>
             <a:off x="519120" y="228600"/>
-            <a:ext cx="11145960" cy="744840"/>
+            <a:ext cx="11145240" cy="744120"/>
           </a:xfrm>
           <a:prstGeom prst="rect">
             <a:avLst/>
@@ -11288,7 +11289,7 @@
               </a:lnSpc>
             </a:pPr>
             <a:r>
-              <a:rPr b="0" lang="en-US" sz="4800" spc="-77" strike="noStrike">
+              <a:rPr b="0" lang="en-US" sz="4800" spc="-72" strike="noStrike">
                 <a:solidFill>
                   <a:srgbClr val="595959"/>
                 </a:solidFill>
@@ -11329,7 +11330,7 @@
         <p:spPr>
           <a:xfrm>
             <a:off x="91440" y="1271160"/>
-            <a:ext cx="9708480" cy="5349240"/>
+            <a:ext cx="9707760" cy="5348520"/>
           </a:xfrm>
           <a:prstGeom prst="rect">
             <a:avLst/>
@@ -11397,7 +11398,7 @@
         <p:spPr>
           <a:xfrm>
             <a:off x="519120" y="228600"/>
-            <a:ext cx="11145960" cy="744840"/>
+            <a:ext cx="11145240" cy="744120"/>
           </a:xfrm>
           <a:prstGeom prst="rect">
             <a:avLst/>
@@ -11422,7 +11423,7 @@
               </a:lnSpc>
             </a:pPr>
             <a:r>
-              <a:rPr b="0" lang="en-US" sz="4800" spc="-77" strike="noStrike">
+              <a:rPr b="0" lang="en-US" sz="4800" spc="-72" strike="noStrike">
                 <a:solidFill>
                   <a:srgbClr val="595959"/>
                 </a:solidFill>
@@ -11434,7 +11435,7 @@
                 <a:latin typeface="Segoe UI Light"/>
                 <a:ea typeface="DejaVu Sans"/>
               </a:rPr>
-              <a:t>Hadoop Cluster on OpenStack</a:t>
+              <a:t>OpenStack Services Interaction</a:t>
             </a:r>
             <a:endParaRPr b="0" lang="en-US" sz="4800" spc="-1" strike="noStrike">
               <a:solidFill>
@@ -11462,8 +11463,8 @@
         </p:blipFill>
         <p:spPr>
           <a:xfrm>
-            <a:off x="598320" y="914400"/>
-            <a:ext cx="7299360" cy="5909040"/>
+            <a:off x="579600" y="945720"/>
+            <a:ext cx="8415000" cy="5820480"/>
           </a:xfrm>
           <a:prstGeom prst="rect">
             <a:avLst/>
@@ -11531,7 +11532,7 @@
         <p:spPr>
           <a:xfrm>
             <a:off x="519120" y="228600"/>
-            <a:ext cx="11145960" cy="744840"/>
+            <a:ext cx="11145240" cy="744120"/>
           </a:xfrm>
           <a:prstGeom prst="rect">
             <a:avLst/>
@@ -11556,7 +11557,7 @@
               </a:lnSpc>
             </a:pPr>
             <a:r>
-              <a:rPr b="0" lang="en-US" sz="5400" spc="-77" strike="noStrike">
+              <a:rPr b="0" lang="en-US" sz="5400" spc="-72" strike="noStrike">
                 <a:solidFill>
                   <a:srgbClr val="595959"/>
                 </a:solidFill>
@@ -11593,7 +11594,7 @@
         <p:spPr>
           <a:xfrm>
             <a:off x="519120" y="1447920"/>
-            <a:ext cx="11145960" cy="2040840"/>
+            <a:ext cx="11145240" cy="2040120"/>
           </a:xfrm>
           <a:prstGeom prst="rect">
             <a:avLst/>
@@ -11612,7 +11613,7 @@
         <p:txBody>
           <a:bodyPr lIns="0" rIns="0" tIns="0" bIns="0"/>
           <a:p>
-            <a:pPr marL="284040" indent="-281160">
+            <a:pPr marL="284040" indent="-280440">
               <a:lnSpc>
                 <a:spcPct val="100000"/>
               </a:lnSpc>
@@ -11627,7 +11628,7 @@
               <a:buChar char=""/>
             </a:pPr>
             <a:r>
-              <a:rPr b="0" lang="en-US" sz="3200" spc="-49" strike="noStrike">
+              <a:rPr b="0" lang="en-US" sz="3200" spc="-43" strike="noStrike">
                 <a:solidFill>
                   <a:srgbClr val="797a7d"/>
                 </a:solidFill>
@@ -11654,7 +11655,7 @@
             </a:endParaRPr>
           </a:p>
           <a:p>
-            <a:pPr marL="284040" indent="-281160">
+            <a:pPr marL="284040" indent="-280440">
               <a:lnSpc>
                 <a:spcPct val="100000"/>
               </a:lnSpc>
@@ -11669,7 +11670,7 @@
               <a:buChar char=""/>
             </a:pPr>
             <a:r>
-              <a:rPr b="0" lang="en-US" sz="3200" spc="-49" strike="noStrike">
+              <a:rPr b="0" lang="en-US" sz="3200" spc="-43" strike="noStrike">
                 <a:solidFill>
                   <a:srgbClr val="797a7d"/>
                 </a:solidFill>
@@ -11684,7 +11685,7 @@
               <a:t>Info lebih lanjut: </a:t>
             </a:r>
             <a:r>
-              <a:rPr b="0" lang="en-US" sz="3200" spc="-49" strike="noStrike" u="sng">
+              <a:rPr b="0" lang="en-US" sz="3200" spc="-43" strike="noStrike" u="sng">
                 <a:solidFill>
                   <a:srgbClr val="0000ff"/>
                 </a:solidFill>
@@ -11771,7 +11772,7 @@
         <p:spPr>
           <a:xfrm>
             <a:off x="519120" y="228600"/>
-            <a:ext cx="11145960" cy="744840"/>
+            <a:ext cx="11145240" cy="744120"/>
           </a:xfrm>
           <a:prstGeom prst="rect">
             <a:avLst/>
@@ -11796,7 +11797,7 @@
               </a:lnSpc>
             </a:pPr>
             <a:r>
-              <a:rPr b="0" lang="en-US" sz="5400" spc="-77" strike="noStrike">
+              <a:rPr b="0" lang="en-US" sz="4800" spc="-72" strike="noStrike">
                 <a:solidFill>
                   <a:srgbClr val="595959"/>
                 </a:solidFill>
@@ -11808,9 +11809,9 @@
                 <a:latin typeface="Segoe UI Light"/>
                 <a:ea typeface="DejaVu Sans"/>
               </a:rPr>
-              <a:t>Sahara Introduction</a:t>
-            </a:r>
-            <a:endParaRPr b="0" lang="en-US" sz="5400" spc="-1" strike="noStrike">
+              <a:t>Hadoop Cluster on OpenStack</a:t>
+            </a:r>
+            <a:endParaRPr b="0" lang="en-US" sz="4800" spc="-1" strike="noStrike">
               <a:solidFill>
                 <a:srgbClr val="000000"/>
               </a:solidFill>
@@ -11824,305 +11825,29 @@
           </a:p>
         </p:txBody>
       </p:sp>
-      <p:sp>
-        <p:nvSpPr>
-          <p:cNvPr id="166" name="CustomShape 2"/>
-          <p:cNvSpPr/>
+      <p:pic>
+        <p:nvPicPr>
+          <p:cNvPr id="166" name="" descr=""/>
+          <p:cNvPicPr/>
           <p:nvPr/>
-        </p:nvSpPr>
-        <p:spPr>
-          <a:xfrm>
-            <a:off x="519120" y="1195920"/>
-            <a:ext cx="11145960" cy="2040840"/>
-          </a:xfrm>
-          <a:prstGeom prst="rect">
-            <a:avLst/>
-          </a:prstGeom>
-          <a:noFill/>
+        </p:nvPicPr>
+        <p:blipFill>
+          <a:blip r:embed="rId1"/>
+          <a:stretch/>
+        </p:blipFill>
+        <p:spPr>
+          <a:xfrm>
+            <a:off x="598320" y="914400"/>
+            <a:ext cx="7298640" cy="5908320"/>
+          </a:xfrm>
+          <a:prstGeom prst="rect">
+            <a:avLst/>
+          </a:prstGeom>
           <a:ln>
             <a:noFill/>
           </a:ln>
         </p:spPr>
-        <p:style>
-          <a:lnRef idx="0"/>
-          <a:fillRef idx="0"/>
-          <a:effectRef idx="0"/>
-          <a:fontRef idx="minor"/>
-        </p:style>
-        <p:txBody>
-          <a:bodyPr lIns="0" rIns="0" tIns="0" bIns="0"/>
-          <a:p>
-            <a:pPr>
-              <a:lnSpc>
-                <a:spcPct val="100000"/>
-              </a:lnSpc>
-              <a:spcBef>
-                <a:spcPts val="641"/>
-              </a:spcBef>
-            </a:pPr>
-            <a:r>
-              <a:rPr b="0" lang="en-US" sz="2800" spc="-49" strike="noStrike">
-                <a:solidFill>
-                  <a:srgbClr val="797a7d"/>
-                </a:solidFill>
-                <a:uFill>
-                  <a:solidFill>
-                    <a:srgbClr val="ffffff"/>
-                  </a:solidFill>
-                </a:uFill>
-                <a:latin typeface="Segoe UI Light"/>
-                <a:ea typeface="DejaVu Sans"/>
-              </a:rPr>
-              <a:t>Provide users with a simple means to provision data processing frameworks (Hadoop, Spark, Storm) clusters by specifying several parameters such as the version, cluster topology, hardware node details and more.</a:t>
-            </a:r>
-            <a:endParaRPr b="0" lang="en-US" sz="2800" spc="-1" strike="noStrike">
-              <a:solidFill>
-                <a:srgbClr val="000000"/>
-              </a:solidFill>
-              <a:uFill>
-                <a:solidFill>
-                  <a:srgbClr val="ffffff"/>
-                </a:solidFill>
-              </a:uFill>
-              <a:latin typeface="Arial"/>
-            </a:endParaRPr>
-          </a:p>
-          <a:p>
-            <a:pPr>
-              <a:lnSpc>
-                <a:spcPct val="100000"/>
-              </a:lnSpc>
-              <a:spcBef>
-                <a:spcPts val="641"/>
-              </a:spcBef>
-            </a:pPr>
-            <a:r>
-              <a:rPr b="0" lang="en-US" sz="2800" spc="-49" strike="noStrike">
-                <a:solidFill>
-                  <a:srgbClr val="797a7d"/>
-                </a:solidFill>
-                <a:uFill>
-                  <a:solidFill>
-                    <a:srgbClr val="ffffff"/>
-                  </a:solidFill>
-                </a:uFill>
-                <a:latin typeface="Segoe UI Light"/>
-                <a:ea typeface="DejaVu Sans"/>
-              </a:rPr>
-              <a:t>Use cases:</a:t>
-            </a:r>
-            <a:endParaRPr b="0" lang="en-US" sz="2800" spc="-1" strike="noStrike">
-              <a:solidFill>
-                <a:srgbClr val="000000"/>
-              </a:solidFill>
-              <a:uFill>
-                <a:solidFill>
-                  <a:srgbClr val="ffffff"/>
-                </a:solidFill>
-              </a:uFill>
-              <a:latin typeface="Arial"/>
-            </a:endParaRPr>
-          </a:p>
-          <a:p>
-            <a:pPr marL="284040" indent="-281160">
-              <a:lnSpc>
-                <a:spcPct val="100000"/>
-              </a:lnSpc>
-              <a:spcBef>
-                <a:spcPts val="641"/>
-              </a:spcBef>
-              <a:buClr>
-                <a:srgbClr val="797a7d"/>
-              </a:buClr>
-              <a:buSzPct val="45000"/>
-              <a:buFont typeface="Wingdings" charset="2"/>
-              <a:buChar char=""/>
-            </a:pPr>
-            <a:r>
-              <a:rPr b="0" lang="en-US" sz="2800" spc="-49" strike="noStrike">
-                <a:solidFill>
-                  <a:srgbClr val="797a7d"/>
-                </a:solidFill>
-                <a:uFill>
-                  <a:solidFill>
-                    <a:srgbClr val="ffffff"/>
-                  </a:solidFill>
-                </a:uFill>
-                <a:latin typeface="Segoe UI Light"/>
-                <a:ea typeface="DejaVu Sans"/>
-              </a:rPr>
-              <a:t>Fast provisioning of data processing clusters on OpenStack for development and quality assurance(QA).</a:t>
-            </a:r>
-            <a:endParaRPr b="0" lang="en-US" sz="2800" spc="-1" strike="noStrike">
-              <a:solidFill>
-                <a:srgbClr val="000000"/>
-              </a:solidFill>
-              <a:uFill>
-                <a:solidFill>
-                  <a:srgbClr val="ffffff"/>
-                </a:solidFill>
-              </a:uFill>
-              <a:latin typeface="Arial"/>
-            </a:endParaRPr>
-          </a:p>
-          <a:p>
-            <a:pPr marL="284040" indent="-281160">
-              <a:lnSpc>
-                <a:spcPct val="100000"/>
-              </a:lnSpc>
-              <a:spcBef>
-                <a:spcPts val="641"/>
-              </a:spcBef>
-              <a:buClr>
-                <a:srgbClr val="797a7d"/>
-              </a:buClr>
-              <a:buSzPct val="45000"/>
-              <a:buFont typeface="Wingdings" charset="2"/>
-              <a:buChar char=""/>
-            </a:pPr>
-            <a:r>
-              <a:rPr b="0" lang="en-US" sz="2800" spc="-49" strike="noStrike">
-                <a:solidFill>
-                  <a:srgbClr val="797a7d"/>
-                </a:solidFill>
-                <a:uFill>
-                  <a:solidFill>
-                    <a:srgbClr val="ffffff"/>
-                  </a:solidFill>
-                </a:uFill>
-                <a:latin typeface="Segoe UI Light"/>
-                <a:ea typeface="DejaVu Sans"/>
-              </a:rPr>
-              <a:t>Utilization of unused compute power from a general purpose OpenStack IaaS cloud.</a:t>
-            </a:r>
-            <a:endParaRPr b="0" lang="en-US" sz="2800" spc="-1" strike="noStrike">
-              <a:solidFill>
-                <a:srgbClr val="000000"/>
-              </a:solidFill>
-              <a:uFill>
-                <a:solidFill>
-                  <a:srgbClr val="ffffff"/>
-                </a:solidFill>
-              </a:uFill>
-              <a:latin typeface="Arial"/>
-            </a:endParaRPr>
-          </a:p>
-          <a:p>
-            <a:pPr marL="284040" indent="-281160">
-              <a:lnSpc>
-                <a:spcPct val="100000"/>
-              </a:lnSpc>
-              <a:spcBef>
-                <a:spcPts val="641"/>
-              </a:spcBef>
-              <a:buClr>
-                <a:srgbClr val="797a7d"/>
-              </a:buClr>
-              <a:buSzPct val="45000"/>
-              <a:buFont typeface="Wingdings" charset="2"/>
-              <a:buChar char=""/>
-            </a:pPr>
-            <a:r>
-              <a:rPr b="0" lang="en-US" sz="2800" spc="-49" strike="noStrike">
-                <a:solidFill>
-                  <a:srgbClr val="797a7d"/>
-                </a:solidFill>
-                <a:uFill>
-                  <a:solidFill>
-                    <a:srgbClr val="ffffff"/>
-                  </a:solidFill>
-                </a:uFill>
-                <a:latin typeface="Segoe UI Light"/>
-                <a:ea typeface="DejaVu Sans"/>
-              </a:rPr>
-              <a:t>“</a:t>
-            </a:r>
-            <a:r>
-              <a:rPr b="0" lang="en-US" sz="2800" spc="-49" strike="noStrike">
-                <a:solidFill>
-                  <a:srgbClr val="797a7d"/>
-                </a:solidFill>
-                <a:uFill>
-                  <a:solidFill>
-                    <a:srgbClr val="ffffff"/>
-                  </a:solidFill>
-                </a:uFill>
-                <a:latin typeface="Segoe UI Light"/>
-                <a:ea typeface="DejaVu Sans"/>
-              </a:rPr>
-              <a:t>Analytics as a Service” for ad-hoc or bursty analytic workloads (similar to AWS EMR).</a:t>
-            </a:r>
-            <a:endParaRPr b="0" lang="en-US" sz="2800" spc="-1" strike="noStrike">
-              <a:solidFill>
-                <a:srgbClr val="000000"/>
-              </a:solidFill>
-              <a:uFill>
-                <a:solidFill>
-                  <a:srgbClr val="ffffff"/>
-                </a:solidFill>
-              </a:uFill>
-              <a:latin typeface="Arial"/>
-            </a:endParaRPr>
-          </a:p>
-          <a:p>
-            <a:pPr>
-              <a:lnSpc>
-                <a:spcPct val="100000"/>
-              </a:lnSpc>
-              <a:spcBef>
-                <a:spcPts val="641"/>
-              </a:spcBef>
-            </a:pPr>
-            <a:endParaRPr b="0" lang="en-US" sz="2800" spc="-1" strike="noStrike">
-              <a:solidFill>
-                <a:srgbClr val="000000"/>
-              </a:solidFill>
-              <a:uFill>
-                <a:solidFill>
-                  <a:srgbClr val="ffffff"/>
-                </a:solidFill>
-              </a:uFill>
-              <a:latin typeface="Arial"/>
-            </a:endParaRPr>
-          </a:p>
-          <a:p>
-            <a:pPr>
-              <a:lnSpc>
-                <a:spcPct val="100000"/>
-              </a:lnSpc>
-              <a:spcBef>
-                <a:spcPts val="641"/>
-              </a:spcBef>
-            </a:pPr>
-            <a:r>
-              <a:rPr b="0" lang="en-US" sz="2800" spc="-49" strike="noStrike">
-                <a:solidFill>
-                  <a:srgbClr val="797a7d"/>
-                </a:solidFill>
-                <a:uFill>
-                  <a:solidFill>
-                    <a:srgbClr val="ffffff"/>
-                  </a:solidFill>
-                </a:uFill>
-                <a:latin typeface="Segoe UI Light"/>
-                <a:ea typeface="DejaVu Sans"/>
-              </a:rPr>
-              <a:t> </a:t>
-            </a:r>
-            <a:endParaRPr b="0" lang="en-US" sz="2800" spc="-1" strike="noStrike">
-              <a:solidFill>
-                <a:srgbClr val="000000"/>
-              </a:solidFill>
-              <a:uFill>
-                <a:solidFill>
-                  <a:srgbClr val="ffffff"/>
-                </a:solidFill>
-              </a:uFill>
-              <a:latin typeface="Arial"/>
-            </a:endParaRPr>
-          </a:p>
-        </p:txBody>
-      </p:sp>
+      </p:pic>
     </p:spTree>
   </p:cSld>
   <p:timing>
@@ -12181,7 +11906,7 @@
         <p:spPr>
           <a:xfrm>
             <a:off x="519120" y="228600"/>
-            <a:ext cx="11145960" cy="744840"/>
+            <a:ext cx="11145240" cy="744120"/>
           </a:xfrm>
           <a:prstGeom prst="rect">
             <a:avLst/>
@@ -12206,7 +11931,7 @@
               </a:lnSpc>
             </a:pPr>
             <a:r>
-              <a:rPr b="0" lang="en-US" sz="5400" spc="-77" strike="noStrike">
+              <a:rPr b="0" lang="en-US" sz="5400" spc="-72" strike="noStrike">
                 <a:solidFill>
                   <a:srgbClr val="595959"/>
                 </a:solidFill>
@@ -12218,7 +11943,7 @@
                 <a:latin typeface="Segoe UI Light"/>
                 <a:ea typeface="DejaVu Sans"/>
               </a:rPr>
-              <a:t>Sahara Key Features</a:t>
+              <a:t>Sahara Introduction</a:t>
             </a:r>
             <a:endParaRPr b="0" lang="en-US" sz="5400" spc="-1" strike="noStrike">
               <a:solidFill>
@@ -12243,7 +11968,7 @@
         <p:spPr>
           <a:xfrm>
             <a:off x="519120" y="1195920"/>
-            <a:ext cx="11145960" cy="2040840"/>
+            <a:ext cx="11145240" cy="2040120"/>
           </a:xfrm>
           <a:prstGeom prst="rect">
             <a:avLst/>
@@ -12262,7 +11987,79 @@
         <p:txBody>
           <a:bodyPr lIns="0" rIns="0" tIns="0" bIns="0"/>
           <a:p>
-            <a:pPr marL="284040" indent="-281160">
+            <a:pPr>
+              <a:lnSpc>
+                <a:spcPct val="100000"/>
+              </a:lnSpc>
+              <a:spcBef>
+                <a:spcPts val="641"/>
+              </a:spcBef>
+            </a:pPr>
+            <a:r>
+              <a:rPr b="0" lang="en-US" sz="2800" spc="-43" strike="noStrike">
+                <a:solidFill>
+                  <a:srgbClr val="797a7d"/>
+                </a:solidFill>
+                <a:uFill>
+                  <a:solidFill>
+                    <a:srgbClr val="ffffff"/>
+                  </a:solidFill>
+                </a:uFill>
+                <a:latin typeface="Segoe UI Light"/>
+                <a:ea typeface="DejaVu Sans"/>
+              </a:rPr>
+              <a:t>Provide users with a simple means to provision data processing frameworks (Hadoop, Spark, Storm) clusters by specifying several parameters such as the version, cluster topology, hardware node details and more.</a:t>
+            </a:r>
+            <a:endParaRPr b="0" lang="en-US" sz="2800" spc="-1" strike="noStrike">
+              <a:solidFill>
+                <a:srgbClr val="000000"/>
+              </a:solidFill>
+              <a:uFill>
+                <a:solidFill>
+                  <a:srgbClr val="ffffff"/>
+                </a:solidFill>
+              </a:uFill>
+              <a:latin typeface="Arial"/>
+            </a:endParaRPr>
+          </a:p>
+          <a:p>
+            <a:pPr>
+              <a:lnSpc>
+                <a:spcPct val="100000"/>
+              </a:lnSpc>
+              <a:spcBef>
+                <a:spcPts val="641"/>
+              </a:spcBef>
+            </a:pPr>
+            <a:r>
+              <a:rPr b="0" lang="en-US" sz="2800" spc="-43" strike="noStrike">
+                <a:solidFill>
+                  <a:srgbClr val="797a7d"/>
+                </a:solidFill>
+                <a:uFill>
+                  <a:solidFill>
+                    <a:srgbClr val="ffffff"/>
+                  </a:solidFill>
+                </a:uFill>
+                <a:latin typeface="Segoe UI Light"/>
+                <a:ea typeface="DejaVu Sans"/>
+              </a:rPr>
+              <a:t>Use cases:</a:t>
+            </a:r>
+            <a:endParaRPr b="0" lang="en-US" sz="2800" spc="-1" strike="noStrike">
+              <a:solidFill>
+                <a:srgbClr val="000000"/>
+              </a:solidFill>
+              <a:uFill>
+                <a:solidFill>
+                  <a:srgbClr val="ffffff"/>
+                </a:solidFill>
+              </a:uFill>
+              <a:latin typeface="Arial"/>
+            </a:endParaRPr>
+          </a:p>
+          <a:p>
+            <a:pPr marL="284040" indent="-280440">
               <a:lnSpc>
                 <a:spcPct val="100000"/>
               </a:lnSpc>
@@ -12277,7 +12074,7 @@
               <a:buChar char=""/>
             </a:pPr>
             <a:r>
-              <a:rPr b="0" lang="en-US" sz="2800" spc="-49" strike="noStrike">
+              <a:rPr b="0" lang="en-US" sz="2800" spc="-43" strike="noStrike">
                 <a:solidFill>
                   <a:srgbClr val="797a7d"/>
                 </a:solidFill>
@@ -12289,7 +12086,7 @@
                 <a:latin typeface="Segoe UI Light"/>
                 <a:ea typeface="DejaVu Sans"/>
               </a:rPr>
-              <a:t>Designed as an OpenStack component.</a:t>
+              <a:t>Fast provisioning of data processing clusters on OpenStack for development and quality assurance(QA).</a:t>
             </a:r>
             <a:endParaRPr b="0" lang="en-US" sz="2800" spc="-1" strike="noStrike">
               <a:solidFill>
@@ -12304,7 +12101,7 @@
             </a:endParaRPr>
           </a:p>
           <a:p>
-            <a:pPr marL="284040" indent="-281160">
+            <a:pPr marL="284040" indent="-280440">
               <a:lnSpc>
                 <a:spcPct val="100000"/>
               </a:lnSpc>
@@ -12319,7 +12116,7 @@
               <a:buChar char=""/>
             </a:pPr>
             <a:r>
-              <a:rPr b="0" lang="en-US" sz="2800" spc="-49" strike="noStrike">
+              <a:rPr b="0" lang="en-US" sz="2800" spc="-43" strike="noStrike">
                 <a:solidFill>
                   <a:srgbClr val="797a7d"/>
                 </a:solidFill>
@@ -12331,7 +12128,7 @@
                 <a:latin typeface="Segoe UI Light"/>
                 <a:ea typeface="DejaVu Sans"/>
               </a:rPr>
-              <a:t>Managed through a REST API with a user interface(UI) available as part of OpenStack Dashboard.</a:t>
+              <a:t>Utilization of unused compute power from a general purpose OpenStack IaaS cloud.</a:t>
             </a:r>
             <a:endParaRPr b="0" lang="en-US" sz="2800" spc="-1" strike="noStrike">
               <a:solidFill>
@@ -12346,7 +12143,7 @@
             </a:endParaRPr>
           </a:p>
           <a:p>
-            <a:pPr marL="284040" indent="-281160">
+            <a:pPr marL="284040" indent="-280440">
               <a:lnSpc>
                 <a:spcPct val="100000"/>
               </a:lnSpc>
@@ -12361,7 +12158,7 @@
               <a:buChar char=""/>
             </a:pPr>
             <a:r>
-              <a:rPr b="0" lang="en-US" sz="2800" spc="-49" strike="noStrike">
+              <a:rPr b="0" lang="en-US" sz="2800" spc="-43" strike="noStrike">
                 <a:solidFill>
                   <a:srgbClr val="797a7d"/>
                 </a:solidFill>
@@ -12373,37 +12170,10 @@
                 <a:latin typeface="Segoe UI Light"/>
                 <a:ea typeface="DejaVu Sans"/>
               </a:rPr>
-              <a:t>Support for a variety of data processing frameworks:</a:t>
-            </a:r>
-            <a:endParaRPr b="0" lang="en-US" sz="2800" spc="-1" strike="noStrike">
-              <a:solidFill>
-                <a:srgbClr val="000000"/>
-              </a:solidFill>
-              <a:uFill>
-                <a:solidFill>
-                  <a:srgbClr val="ffffff"/>
-                </a:solidFill>
-              </a:uFill>
-              <a:latin typeface="Arial"/>
-            </a:endParaRPr>
-          </a:p>
-          <a:p>
-            <a:pPr marL="448200" indent="-281160">
-              <a:lnSpc>
-                <a:spcPct val="100000"/>
-              </a:lnSpc>
-              <a:spcBef>
-                <a:spcPts val="641"/>
-              </a:spcBef>
-              <a:buClr>
-                <a:srgbClr val="797a7d"/>
-              </a:buClr>
-              <a:buSzPct val="45000"/>
-              <a:buFont typeface="Wingdings" charset="2"/>
-              <a:buChar char=""/>
-            </a:pPr>
-            <a:r>
-              <a:rPr b="0" lang="en-US" sz="2800" spc="-49" strike="noStrike">
+              <a:t>“</a:t>
+            </a:r>
+            <a:r>
+              <a:rPr b="0" lang="en-US" sz="2800" spc="-43" strike="noStrike">
                 <a:solidFill>
                   <a:srgbClr val="797a7d"/>
                 </a:solidFill>
@@ -12415,175 +12185,7 @@
                 <a:latin typeface="Segoe UI Light"/>
                 <a:ea typeface="DejaVu Sans"/>
               </a:rPr>
-              <a:t>Multiple Hadoop vendor distributions.</a:t>
-            </a:r>
-            <a:endParaRPr b="0" lang="en-US" sz="2800" spc="-1" strike="noStrike">
-              <a:solidFill>
-                <a:srgbClr val="000000"/>
-              </a:solidFill>
-              <a:uFill>
-                <a:solidFill>
-                  <a:srgbClr val="ffffff"/>
-                </a:solidFill>
-              </a:uFill>
-              <a:latin typeface="Arial"/>
-            </a:endParaRPr>
-          </a:p>
-          <a:p>
-            <a:pPr marL="448200" indent="-281160">
-              <a:lnSpc>
-                <a:spcPct val="100000"/>
-              </a:lnSpc>
-              <a:spcBef>
-                <a:spcPts val="641"/>
-              </a:spcBef>
-              <a:buClr>
-                <a:srgbClr val="797a7d"/>
-              </a:buClr>
-              <a:buSzPct val="45000"/>
-              <a:buFont typeface="Wingdings" charset="2"/>
-              <a:buChar char=""/>
-            </a:pPr>
-            <a:r>
-              <a:rPr b="0" lang="en-US" sz="2800" spc="-49" strike="noStrike">
-                <a:solidFill>
-                  <a:srgbClr val="797a7d"/>
-                </a:solidFill>
-                <a:uFill>
-                  <a:solidFill>
-                    <a:srgbClr val="ffffff"/>
-                  </a:solidFill>
-                </a:uFill>
-                <a:latin typeface="Segoe UI Light"/>
-                <a:ea typeface="DejaVu Sans"/>
-              </a:rPr>
-              <a:t>Apache Spark and Storm.</a:t>
-            </a:r>
-            <a:endParaRPr b="0" lang="en-US" sz="2800" spc="-1" strike="noStrike">
-              <a:solidFill>
-                <a:srgbClr val="000000"/>
-              </a:solidFill>
-              <a:uFill>
-                <a:solidFill>
-                  <a:srgbClr val="ffffff"/>
-                </a:solidFill>
-              </a:uFill>
-              <a:latin typeface="Arial"/>
-            </a:endParaRPr>
-          </a:p>
-          <a:p>
-            <a:pPr marL="448200" indent="-281160">
-              <a:lnSpc>
-                <a:spcPct val="100000"/>
-              </a:lnSpc>
-              <a:spcBef>
-                <a:spcPts val="641"/>
-              </a:spcBef>
-              <a:buClr>
-                <a:srgbClr val="797a7d"/>
-              </a:buClr>
-              <a:buSzPct val="45000"/>
-              <a:buFont typeface="Wingdings" charset="2"/>
-              <a:buChar char=""/>
-            </a:pPr>
-            <a:r>
-              <a:rPr b="0" lang="en-US" sz="2800" spc="-49" strike="noStrike">
-                <a:solidFill>
-                  <a:srgbClr val="797a7d"/>
-                </a:solidFill>
-                <a:uFill>
-                  <a:solidFill>
-                    <a:srgbClr val="ffffff"/>
-                  </a:solidFill>
-                </a:uFill>
-                <a:latin typeface="Segoe UI Light"/>
-                <a:ea typeface="DejaVu Sans"/>
-              </a:rPr>
-              <a:t>Pluggable system of Hadoop installation engines.</a:t>
-            </a:r>
-            <a:endParaRPr b="0" lang="en-US" sz="2800" spc="-1" strike="noStrike">
-              <a:solidFill>
-                <a:srgbClr val="000000"/>
-              </a:solidFill>
-              <a:uFill>
-                <a:solidFill>
-                  <a:srgbClr val="ffffff"/>
-                </a:solidFill>
-              </a:uFill>
-              <a:latin typeface="Arial"/>
-            </a:endParaRPr>
-          </a:p>
-          <a:p>
-            <a:pPr marL="448200" indent="-281160">
-              <a:lnSpc>
-                <a:spcPct val="100000"/>
-              </a:lnSpc>
-              <a:spcBef>
-                <a:spcPts val="641"/>
-              </a:spcBef>
-              <a:buClr>
-                <a:srgbClr val="797a7d"/>
-              </a:buClr>
-              <a:buSzPct val="45000"/>
-              <a:buFont typeface="Wingdings" charset="2"/>
-              <a:buChar char=""/>
-            </a:pPr>
-            <a:r>
-              <a:rPr b="0" lang="en-US" sz="2800" spc="-49" strike="noStrike">
-                <a:solidFill>
-                  <a:srgbClr val="797a7d"/>
-                </a:solidFill>
-                <a:uFill>
-                  <a:solidFill>
-                    <a:srgbClr val="ffffff"/>
-                  </a:solidFill>
-                </a:uFill>
-                <a:latin typeface="Segoe UI Light"/>
-                <a:ea typeface="DejaVu Sans"/>
-              </a:rPr>
-              <a:t>Integration with vendor specific management tools, such as Apache Ambari and Cloudera Management Console.</a:t>
-            </a:r>
-            <a:endParaRPr b="0" lang="en-US" sz="2800" spc="-1" strike="noStrike">
-              <a:solidFill>
-                <a:srgbClr val="000000"/>
-              </a:solidFill>
-              <a:uFill>
-                <a:solidFill>
-                  <a:srgbClr val="ffffff"/>
-                </a:solidFill>
-              </a:uFill>
-              <a:latin typeface="Arial"/>
-            </a:endParaRPr>
-          </a:p>
-          <a:p>
-            <a:pPr marL="284040" indent="-281160">
-              <a:lnSpc>
-                <a:spcPct val="100000"/>
-              </a:lnSpc>
-              <a:spcBef>
-                <a:spcPts val="641"/>
-              </a:spcBef>
-              <a:buClr>
-                <a:srgbClr val="797a7d"/>
-              </a:buClr>
-              <a:buSzPct val="45000"/>
-              <a:buFont typeface="Wingdings" charset="2"/>
-              <a:buChar char=""/>
-            </a:pPr>
-            <a:r>
-              <a:rPr b="0" lang="en-US" sz="2800" spc="-49" strike="noStrike">
-                <a:solidFill>
-                  <a:srgbClr val="797a7d"/>
-                </a:solidFill>
-                <a:uFill>
-                  <a:solidFill>
-                    <a:srgbClr val="ffffff"/>
-                  </a:solidFill>
-                </a:uFill>
-                <a:latin typeface="Segoe UI Light"/>
-                <a:ea typeface="DejaVu Sans"/>
-              </a:rPr>
-              <a:t>Predefined configuration templates with the ability to modify parameters.</a:t>
+              <a:t>Analytics as a Service” for ad-hoc or bursty analytic workloads (similar to AWS EMR).</a:t>
             </a:r>
             <a:endParaRPr b="0" lang="en-US" sz="2800" spc="-1" strike="noStrike">
               <a:solidFill>
@@ -12606,6 +12208,42 @@
                 <a:spcPts val="641"/>
               </a:spcBef>
             </a:pPr>
+            <a:endParaRPr b="0" lang="en-US" sz="2800" spc="-1" strike="noStrike">
+              <a:solidFill>
+                <a:srgbClr val="000000"/>
+              </a:solidFill>
+              <a:uFill>
+                <a:solidFill>
+                  <a:srgbClr val="ffffff"/>
+                </a:solidFill>
+              </a:uFill>
+              <a:latin typeface="Arial"/>
+            </a:endParaRPr>
+          </a:p>
+          <a:p>
+            <a:pPr>
+              <a:lnSpc>
+                <a:spcPct val="100000"/>
+              </a:lnSpc>
+              <a:spcBef>
+                <a:spcPts val="641"/>
+              </a:spcBef>
+            </a:pPr>
+            <a:r>
+              <a:rPr b="0" lang="en-US" sz="2800" spc="-43" strike="noStrike">
+                <a:solidFill>
+                  <a:srgbClr val="797a7d"/>
+                </a:solidFill>
+                <a:uFill>
+                  <a:solidFill>
+                    <a:srgbClr val="ffffff"/>
+                  </a:solidFill>
+                </a:uFill>
+                <a:latin typeface="Segoe UI Light"/>
+                <a:ea typeface="DejaVu Sans"/>
+              </a:rPr>
+              <a:t> </a:t>
+            </a:r>
             <a:endParaRPr b="0" lang="en-US" sz="2800" spc="-1" strike="noStrike">
               <a:solidFill>
                 <a:srgbClr val="000000"/>
@@ -12678,7 +12316,7 @@
         <p:spPr>
           <a:xfrm>
             <a:off x="519120" y="228600"/>
-            <a:ext cx="11145960" cy="744840"/>
+            <a:ext cx="11145240" cy="744120"/>
           </a:xfrm>
           <a:prstGeom prst="rect">
             <a:avLst/>
@@ -12703,7 +12341,7 @@
               </a:lnSpc>
             </a:pPr>
             <a:r>
-              <a:rPr b="0" lang="en-US" sz="4800" spc="-77" strike="noStrike">
+              <a:rPr b="0" lang="en-US" sz="5400" spc="-72" strike="noStrike">
                 <a:solidFill>
                   <a:srgbClr val="595959"/>
                 </a:solidFill>
@@ -12715,9 +12353,9 @@
                 <a:latin typeface="Segoe UI Light"/>
                 <a:ea typeface="DejaVu Sans"/>
               </a:rPr>
-              <a:t>Sahara and Other OpenStack Services</a:t>
-            </a:r>
-            <a:endParaRPr b="0" lang="en-US" sz="4800" spc="-1" strike="noStrike">
+              <a:t>Sahara Key Features</a:t>
+            </a:r>
+            <a:endParaRPr b="0" lang="en-US" sz="5400" spc="-1" strike="noStrike">
               <a:solidFill>
                 <a:srgbClr val="000000"/>
               </a:solidFill>
@@ -12731,29 +12369,392 @@
           </a:p>
         </p:txBody>
       </p:sp>
-      <p:pic>
-        <p:nvPicPr>
-          <p:cNvPr id="170" name="" descr=""/>
-          <p:cNvPicPr/>
+      <p:sp>
+        <p:nvSpPr>
+          <p:cNvPr id="170" name="CustomShape 2"/>
+          <p:cNvSpPr/>
           <p:nvPr/>
-        </p:nvPicPr>
-        <p:blipFill>
-          <a:blip r:embed="rId1"/>
-          <a:stretch/>
-        </p:blipFill>
-        <p:spPr>
-          <a:xfrm>
-            <a:off x="920160" y="175680"/>
-            <a:ext cx="10005120" cy="7503120"/>
-          </a:xfrm>
-          <a:prstGeom prst="rect">
-            <a:avLst/>
-          </a:prstGeom>
+        </p:nvSpPr>
+        <p:spPr>
+          <a:xfrm>
+            <a:off x="519120" y="1195920"/>
+            <a:ext cx="11145240" cy="2040120"/>
+          </a:xfrm>
+          <a:prstGeom prst="rect">
+            <a:avLst/>
+          </a:prstGeom>
+          <a:noFill/>
           <a:ln>
             <a:noFill/>
           </a:ln>
         </p:spPr>
-      </p:pic>
+        <p:style>
+          <a:lnRef idx="0"/>
+          <a:fillRef idx="0"/>
+          <a:effectRef idx="0"/>
+          <a:fontRef idx="minor"/>
+        </p:style>
+        <p:txBody>
+          <a:bodyPr lIns="0" rIns="0" tIns="0" bIns="0"/>
+          <a:p>
+            <a:pPr marL="284040" indent="-280440">
+              <a:lnSpc>
+                <a:spcPct val="100000"/>
+              </a:lnSpc>
+              <a:spcBef>
+                <a:spcPts val="641"/>
+              </a:spcBef>
+              <a:buClr>
+                <a:srgbClr val="797a7d"/>
+              </a:buClr>
+              <a:buSzPct val="45000"/>
+              <a:buFont typeface="Wingdings" charset="2"/>
+              <a:buChar char=""/>
+            </a:pPr>
+            <a:r>
+              <a:rPr b="0" lang="en-US" sz="2800" spc="-43" strike="noStrike">
+                <a:solidFill>
+                  <a:srgbClr val="797a7d"/>
+                </a:solidFill>
+                <a:uFill>
+                  <a:solidFill>
+                    <a:srgbClr val="ffffff"/>
+                  </a:solidFill>
+                </a:uFill>
+                <a:latin typeface="Segoe UI Light"/>
+                <a:ea typeface="DejaVu Sans"/>
+              </a:rPr>
+              <a:t>Designed as an OpenStack component.</a:t>
+            </a:r>
+            <a:endParaRPr b="0" lang="en-US" sz="2800" spc="-1" strike="noStrike">
+              <a:solidFill>
+                <a:srgbClr val="000000"/>
+              </a:solidFill>
+              <a:uFill>
+                <a:solidFill>
+                  <a:srgbClr val="ffffff"/>
+                </a:solidFill>
+              </a:uFill>
+              <a:latin typeface="Arial"/>
+            </a:endParaRPr>
+          </a:p>
+          <a:p>
+            <a:pPr marL="284040" indent="-280440">
+              <a:lnSpc>
+                <a:spcPct val="100000"/>
+              </a:lnSpc>
+              <a:spcBef>
+                <a:spcPts val="641"/>
+              </a:spcBef>
+              <a:buClr>
+                <a:srgbClr val="797a7d"/>
+              </a:buClr>
+              <a:buSzPct val="45000"/>
+              <a:buFont typeface="Wingdings" charset="2"/>
+              <a:buChar char=""/>
+            </a:pPr>
+            <a:r>
+              <a:rPr b="0" lang="en-US" sz="2800" spc="-43" strike="noStrike">
+                <a:solidFill>
+                  <a:srgbClr val="797a7d"/>
+                </a:solidFill>
+                <a:uFill>
+                  <a:solidFill>
+                    <a:srgbClr val="ffffff"/>
+                  </a:solidFill>
+                </a:uFill>
+                <a:latin typeface="Segoe UI Light"/>
+                <a:ea typeface="DejaVu Sans"/>
+              </a:rPr>
+              <a:t>Managed through a REST API with a user interface(UI) available as part of OpenStack Dashboard.</a:t>
+            </a:r>
+            <a:endParaRPr b="0" lang="en-US" sz="2800" spc="-1" strike="noStrike">
+              <a:solidFill>
+                <a:srgbClr val="000000"/>
+              </a:solidFill>
+              <a:uFill>
+                <a:solidFill>
+                  <a:srgbClr val="ffffff"/>
+                </a:solidFill>
+              </a:uFill>
+              <a:latin typeface="Arial"/>
+            </a:endParaRPr>
+          </a:p>
+          <a:p>
+            <a:pPr marL="284040" indent="-280440">
+              <a:lnSpc>
+                <a:spcPct val="100000"/>
+              </a:lnSpc>
+              <a:spcBef>
+                <a:spcPts val="641"/>
+              </a:spcBef>
+              <a:buClr>
+                <a:srgbClr val="797a7d"/>
+              </a:buClr>
+              <a:buSzPct val="45000"/>
+              <a:buFont typeface="Wingdings" charset="2"/>
+              <a:buChar char=""/>
+            </a:pPr>
+            <a:r>
+              <a:rPr b="0" lang="en-US" sz="2800" spc="-43" strike="noStrike">
+                <a:solidFill>
+                  <a:srgbClr val="797a7d"/>
+                </a:solidFill>
+                <a:uFill>
+                  <a:solidFill>
+                    <a:srgbClr val="ffffff"/>
+                  </a:solidFill>
+                </a:uFill>
+                <a:latin typeface="Segoe UI Light"/>
+                <a:ea typeface="DejaVu Sans"/>
+              </a:rPr>
+              <a:t>Support for a variety of data processing frameworks:</a:t>
+            </a:r>
+            <a:endParaRPr b="0" lang="en-US" sz="2800" spc="-1" strike="noStrike">
+              <a:solidFill>
+                <a:srgbClr val="000000"/>
+              </a:solidFill>
+              <a:uFill>
+                <a:solidFill>
+                  <a:srgbClr val="ffffff"/>
+                </a:solidFill>
+              </a:uFill>
+              <a:latin typeface="Arial"/>
+            </a:endParaRPr>
+          </a:p>
+          <a:p>
+            <a:pPr marL="448200" indent="-280440">
+              <a:lnSpc>
+                <a:spcPct val="100000"/>
+              </a:lnSpc>
+              <a:spcBef>
+                <a:spcPts val="641"/>
+              </a:spcBef>
+              <a:buClr>
+                <a:srgbClr val="797a7d"/>
+              </a:buClr>
+              <a:buSzPct val="45000"/>
+              <a:buFont typeface="Wingdings" charset="2"/>
+              <a:buChar char=""/>
+            </a:pPr>
+            <a:r>
+              <a:rPr b="0" lang="en-US" sz="2800" spc="-43" strike="noStrike">
+                <a:solidFill>
+                  <a:srgbClr val="797a7d"/>
+                </a:solidFill>
+                <a:uFill>
+                  <a:solidFill>
+                    <a:srgbClr val="ffffff"/>
+                  </a:solidFill>
+                </a:uFill>
+                <a:latin typeface="Segoe UI Light"/>
+                <a:ea typeface="DejaVu Sans"/>
+              </a:rPr>
+              <a:t>Multiple Hadoop vendor distributions.</a:t>
+            </a:r>
+            <a:endParaRPr b="0" lang="en-US" sz="2800" spc="-1" strike="noStrike">
+              <a:solidFill>
+                <a:srgbClr val="000000"/>
+              </a:solidFill>
+              <a:uFill>
+                <a:solidFill>
+                  <a:srgbClr val="ffffff"/>
+                </a:solidFill>
+              </a:uFill>
+              <a:latin typeface="Arial"/>
+            </a:endParaRPr>
+          </a:p>
+          <a:p>
+            <a:pPr marL="448200" indent="-280440">
+              <a:lnSpc>
+                <a:spcPct val="100000"/>
+              </a:lnSpc>
+              <a:spcBef>
+                <a:spcPts val="641"/>
+              </a:spcBef>
+              <a:buClr>
+                <a:srgbClr val="797a7d"/>
+              </a:buClr>
+              <a:buSzPct val="45000"/>
+              <a:buFont typeface="Wingdings" charset="2"/>
+              <a:buChar char=""/>
+            </a:pPr>
+            <a:r>
+              <a:rPr b="0" lang="en-US" sz="2800" spc="-43" strike="noStrike">
+                <a:solidFill>
+                  <a:srgbClr val="797a7d"/>
+                </a:solidFill>
+                <a:uFill>
+                  <a:solidFill>
+                    <a:srgbClr val="ffffff"/>
+                  </a:solidFill>
+                </a:uFill>
+                <a:latin typeface="Segoe UI Light"/>
+                <a:ea typeface="DejaVu Sans"/>
+              </a:rPr>
+              <a:t>Apache Spark and Storm.</a:t>
+            </a:r>
+            <a:endParaRPr b="0" lang="en-US" sz="2800" spc="-1" strike="noStrike">
+              <a:solidFill>
+                <a:srgbClr val="000000"/>
+              </a:solidFill>
+              <a:uFill>
+                <a:solidFill>
+                  <a:srgbClr val="ffffff"/>
+                </a:solidFill>
+              </a:uFill>
+              <a:latin typeface="Arial"/>
+            </a:endParaRPr>
+          </a:p>
+          <a:p>
+            <a:pPr marL="448200" indent="-280440">
+              <a:lnSpc>
+                <a:spcPct val="100000"/>
+              </a:lnSpc>
+              <a:spcBef>
+                <a:spcPts val="641"/>
+              </a:spcBef>
+              <a:buClr>
+                <a:srgbClr val="797a7d"/>
+              </a:buClr>
+              <a:buSzPct val="45000"/>
+              <a:buFont typeface="Wingdings" charset="2"/>
+              <a:buChar char=""/>
+            </a:pPr>
+            <a:r>
+              <a:rPr b="0" lang="en-US" sz="2800" spc="-43" strike="noStrike">
+                <a:solidFill>
+                  <a:srgbClr val="797a7d"/>
+                </a:solidFill>
+                <a:uFill>
+                  <a:solidFill>
+                    <a:srgbClr val="ffffff"/>
+                  </a:solidFill>
+                </a:uFill>
+                <a:latin typeface="Segoe UI Light"/>
+                <a:ea typeface="DejaVu Sans"/>
+              </a:rPr>
+              <a:t>Pluggable system of Hadoop installation engines.</a:t>
+            </a:r>
+            <a:endParaRPr b="0" lang="en-US" sz="2800" spc="-1" strike="noStrike">
+              <a:solidFill>
+                <a:srgbClr val="000000"/>
+              </a:solidFill>
+              <a:uFill>
+                <a:solidFill>
+                  <a:srgbClr val="ffffff"/>
+                </a:solidFill>
+              </a:uFill>
+              <a:latin typeface="Arial"/>
+            </a:endParaRPr>
+          </a:p>
+          <a:p>
+            <a:pPr marL="448200" indent="-280440">
+              <a:lnSpc>
+                <a:spcPct val="100000"/>
+              </a:lnSpc>
+              <a:spcBef>
+                <a:spcPts val="641"/>
+              </a:spcBef>
+              <a:buClr>
+                <a:srgbClr val="797a7d"/>
+              </a:buClr>
+              <a:buSzPct val="45000"/>
+              <a:buFont typeface="Wingdings" charset="2"/>
+              <a:buChar char=""/>
+            </a:pPr>
+            <a:r>
+              <a:rPr b="0" lang="en-US" sz="2800" spc="-43" strike="noStrike">
+                <a:solidFill>
+                  <a:srgbClr val="797a7d"/>
+                </a:solidFill>
+                <a:uFill>
+                  <a:solidFill>
+                    <a:srgbClr val="ffffff"/>
+                  </a:solidFill>
+                </a:uFill>
+                <a:latin typeface="Segoe UI Light"/>
+                <a:ea typeface="DejaVu Sans"/>
+              </a:rPr>
+              <a:t>Integration with vendor specific management tools, such as Apache Ambari and Cloudera Management Console.</a:t>
+            </a:r>
+            <a:endParaRPr b="0" lang="en-US" sz="2800" spc="-1" strike="noStrike">
+              <a:solidFill>
+                <a:srgbClr val="000000"/>
+              </a:solidFill>
+              <a:uFill>
+                <a:solidFill>
+                  <a:srgbClr val="ffffff"/>
+                </a:solidFill>
+              </a:uFill>
+              <a:latin typeface="Arial"/>
+            </a:endParaRPr>
+          </a:p>
+          <a:p>
+            <a:pPr marL="284040" indent="-280440">
+              <a:lnSpc>
+                <a:spcPct val="100000"/>
+              </a:lnSpc>
+              <a:spcBef>
+                <a:spcPts val="641"/>
+              </a:spcBef>
+              <a:buClr>
+                <a:srgbClr val="797a7d"/>
+              </a:buClr>
+              <a:buSzPct val="45000"/>
+              <a:buFont typeface="Wingdings" charset="2"/>
+              <a:buChar char=""/>
+            </a:pPr>
+            <a:r>
+              <a:rPr b="0" lang="en-US" sz="2800" spc="-43" strike="noStrike">
+                <a:solidFill>
+                  <a:srgbClr val="797a7d"/>
+                </a:solidFill>
+                <a:uFill>
+                  <a:solidFill>
+                    <a:srgbClr val="ffffff"/>
+                  </a:solidFill>
+                </a:uFill>
+                <a:latin typeface="Segoe UI Light"/>
+                <a:ea typeface="DejaVu Sans"/>
+              </a:rPr>
+              <a:t>Predefined configuration templates with the ability to modify parameters.</a:t>
+            </a:r>
+            <a:endParaRPr b="0" lang="en-US" sz="2800" spc="-1" strike="noStrike">
+              <a:solidFill>
+                <a:srgbClr val="000000"/>
+              </a:solidFill>
+              <a:uFill>
+                <a:solidFill>
+                  <a:srgbClr val="ffffff"/>
+                </a:solidFill>
+              </a:uFill>
+              <a:latin typeface="Arial"/>
+            </a:endParaRPr>
+          </a:p>
+          <a:p>
+            <a:pPr>
+              <a:lnSpc>
+                <a:spcPct val="100000"/>
+              </a:lnSpc>
+              <a:spcBef>
+                <a:spcPts val="641"/>
+              </a:spcBef>
+            </a:pPr>
+            <a:endParaRPr b="0" lang="en-US" sz="2800" spc="-1" strike="noStrike">
+              <a:solidFill>
+                <a:srgbClr val="000000"/>
+              </a:solidFill>
+              <a:uFill>
+                <a:solidFill>
+                  <a:srgbClr val="ffffff"/>
+                </a:solidFill>
+              </a:uFill>
+              <a:latin typeface="Arial"/>
+            </a:endParaRPr>
+          </a:p>
+        </p:txBody>
+      </p:sp>
     </p:spTree>
   </p:cSld>
   <p:timing>
@@ -12812,7 +12813,7 @@
         <p:spPr>
           <a:xfrm>
             <a:off x="519120" y="228600"/>
-            <a:ext cx="11145960" cy="744840"/>
+            <a:ext cx="11145240" cy="744120"/>
           </a:xfrm>
           <a:prstGeom prst="rect">
             <a:avLst/>
@@ -12837,7 +12838,7 @@
               </a:lnSpc>
             </a:pPr>
             <a:r>
-              <a:rPr b="0" lang="en-US" sz="4800" spc="-77" strike="noStrike">
+              <a:rPr b="0" lang="en-US" sz="4800" spc="-72" strike="noStrike">
                 <a:solidFill>
                   <a:srgbClr val="595959"/>
                 </a:solidFill>
@@ -12849,7 +12850,7 @@
                 <a:latin typeface="Segoe UI Light"/>
                 <a:ea typeface="DejaVu Sans"/>
               </a:rPr>
-              <a:t>Sahara Architecture</a:t>
+              <a:t>Sahara and Other OpenStack Services</a:t>
             </a:r>
             <a:endParaRPr b="0" lang="en-US" sz="4800" spc="-1" strike="noStrike">
               <a:solidFill>
@@ -12864,36 +12865,10 @@
             </a:endParaRPr>
           </a:p>
         </p:txBody>
-      </p:sp>
-      <p:sp>
-        <p:nvSpPr>
-          <p:cNvPr id="172" name="CustomShape 2"/>
-          <p:cNvSpPr/>
-          <p:nvPr/>
-        </p:nvSpPr>
-        <p:spPr>
-          <a:xfrm>
-            <a:off x="6049440" y="3489120"/>
-            <a:ext cx="178560" cy="228960"/>
-          </a:xfrm>
-          <a:prstGeom prst="rect">
-            <a:avLst/>
-          </a:prstGeom>
-          <a:noFill/>
-          <a:ln>
-            <a:noFill/>
-          </a:ln>
-        </p:spPr>
-        <p:style>
-          <a:lnRef idx="0"/>
-          <a:fillRef idx="0"/>
-          <a:effectRef idx="0"/>
-          <a:fontRef idx="minor"/>
-        </p:style>
       </p:sp>
       <p:pic>
         <p:nvPicPr>
-          <p:cNvPr id="173" name="" descr=""/>
+          <p:cNvPr id="172" name="" descr=""/>
           <p:cNvPicPr/>
           <p:nvPr/>
         </p:nvPicPr>
@@ -12903,8 +12878,8 @@
         </p:blipFill>
         <p:spPr>
           <a:xfrm>
-            <a:off x="548640" y="927360"/>
-            <a:ext cx="8958960" cy="5931000"/>
+            <a:off x="920160" y="175680"/>
+            <a:ext cx="10004400" cy="7502400"/>
           </a:xfrm>
           <a:prstGeom prst="rect">
             <a:avLst/>
@@ -12965,14 +12940,14 @@
       </p:grpSpPr>
       <p:sp>
         <p:nvSpPr>
-          <p:cNvPr id="174" name="CustomShape 1"/>
+          <p:cNvPr id="173" name="CustomShape 1"/>
           <p:cNvSpPr/>
           <p:nvPr/>
         </p:nvSpPr>
         <p:spPr>
           <a:xfrm>
             <a:off x="519120" y="228600"/>
-            <a:ext cx="11145960" cy="744840"/>
+            <a:ext cx="11145240" cy="744120"/>
           </a:xfrm>
           <a:prstGeom prst="rect">
             <a:avLst/>
@@ -12997,7 +12972,7 @@
               </a:lnSpc>
             </a:pPr>
             <a:r>
-              <a:rPr b="0" lang="en-US" sz="5400" spc="-77" strike="noStrike">
+              <a:rPr b="0" lang="en-US" sz="4800" spc="-72" strike="noStrike">
                 <a:solidFill>
                   <a:srgbClr val="595959"/>
                 </a:solidFill>
@@ -13009,9 +12984,9 @@
                 <a:latin typeface="Segoe UI Light"/>
                 <a:ea typeface="DejaVu Sans"/>
               </a:rPr>
-              <a:t>Cluster Provisioning Workflow</a:t>
-            </a:r>
-            <a:endParaRPr b="0" lang="en-US" sz="5400" spc="-1" strike="noStrike">
+              <a:t>Sahara Architecture</a:t>
+            </a:r>
+            <a:endParaRPr b="0" lang="en-US" sz="4800" spc="-1" strike="noStrike">
               <a:solidFill>
                 <a:srgbClr val="000000"/>
               </a:solidFill>
@@ -13027,14 +13002,14 @@
       </p:sp>
       <p:sp>
         <p:nvSpPr>
-          <p:cNvPr id="175" name="CustomShape 2"/>
+          <p:cNvPr id="174" name="CustomShape 2"/>
           <p:cNvSpPr/>
           <p:nvPr/>
         </p:nvSpPr>
         <p:spPr>
           <a:xfrm>
-            <a:off x="519120" y="1195920"/>
-            <a:ext cx="11145960" cy="2040840"/>
+            <a:off x="6049440" y="3489120"/>
+            <a:ext cx="177840" cy="228240"/>
           </a:xfrm>
           <a:prstGeom prst="rect">
             <a:avLst/>
@@ -13050,320 +13025,30 @@
           <a:effectRef idx="0"/>
           <a:fontRef idx="minor"/>
         </p:style>
-        <p:txBody>
-          <a:bodyPr lIns="0" rIns="0" tIns="0" bIns="0"/>
-          <a:p>
-            <a:pPr marL="284040" indent="-281160">
-              <a:lnSpc>
-                <a:spcPct val="100000"/>
-              </a:lnSpc>
-              <a:spcBef>
-                <a:spcPts val="641"/>
-              </a:spcBef>
-              <a:buClr>
-                <a:srgbClr val="797a7d"/>
-              </a:buClr>
-              <a:buSzPct val="45000"/>
-              <a:buFont typeface="Wingdings" charset="2"/>
-              <a:buChar char=""/>
-            </a:pPr>
-            <a:r>
-              <a:rPr b="0" lang="en-US" sz="2800" spc="-49" strike="noStrike">
-                <a:solidFill>
-                  <a:srgbClr val="797a7d"/>
-                </a:solidFill>
-                <a:uFill>
-                  <a:solidFill>
-                    <a:srgbClr val="ffffff"/>
-                  </a:solidFill>
-                </a:uFill>
-                <a:latin typeface="Segoe UI Light"/>
-                <a:ea typeface="DejaVu Sans"/>
-              </a:rPr>
-              <a:t>Select a Hadoop (or framework) version.</a:t>
-            </a:r>
-            <a:endParaRPr b="0" lang="en-US" sz="2800" spc="-1" strike="noStrike">
-              <a:solidFill>
-                <a:srgbClr val="000000"/>
-              </a:solidFill>
-              <a:uFill>
-                <a:solidFill>
-                  <a:srgbClr val="ffffff"/>
-                </a:solidFill>
-              </a:uFill>
-              <a:latin typeface="Arial"/>
-            </a:endParaRPr>
-          </a:p>
-          <a:p>
-            <a:pPr marL="284040" indent="-281160">
-              <a:lnSpc>
-                <a:spcPct val="100000"/>
-              </a:lnSpc>
-              <a:spcBef>
-                <a:spcPts val="641"/>
-              </a:spcBef>
-              <a:buClr>
-                <a:srgbClr val="797a7d"/>
-              </a:buClr>
-              <a:buSzPct val="45000"/>
-              <a:buFont typeface="Wingdings" charset="2"/>
-              <a:buChar char=""/>
-            </a:pPr>
-            <a:r>
-              <a:rPr b="0" lang="en-US" sz="2800" spc="-49" strike="noStrike">
-                <a:solidFill>
-                  <a:srgbClr val="797a7d"/>
-                </a:solidFill>
-                <a:uFill>
-                  <a:solidFill>
-                    <a:srgbClr val="ffffff"/>
-                  </a:solidFill>
-                </a:uFill>
-                <a:latin typeface="Segoe UI Light"/>
-                <a:ea typeface="DejaVu Sans"/>
-              </a:rPr>
-              <a:t>Select a base image with or without pre-installed data processing framework. Download prepared up-to-date images from </a:t>
-            </a:r>
-            <a:r>
-              <a:rPr b="0" lang="en-US" sz="2800" spc="-49" strike="noStrike" u="sng">
-                <a:solidFill>
-                  <a:srgbClr val="0000ff"/>
-                </a:solidFill>
-                <a:uFill>
-                  <a:solidFill>
-                    <a:srgbClr val="ffffff"/>
-                  </a:solidFill>
-                </a:uFill>
-                <a:latin typeface="Segoe UI Light"/>
-                <a:ea typeface="DejaVu Sans"/>
-                <a:hlinkClick r:id="rId1"/>
-              </a:rPr>
-              <a:t>http://sahara-files.mirantis.com/images/upstream/</a:t>
-            </a:r>
-            <a:endParaRPr b="0" lang="en-US" sz="2800" spc="-1" strike="noStrike">
-              <a:solidFill>
-                <a:srgbClr val="000000"/>
-              </a:solidFill>
-              <a:uFill>
-                <a:solidFill>
-                  <a:srgbClr val="ffffff"/>
-                </a:solidFill>
-              </a:uFill>
-              <a:latin typeface="Arial"/>
-            </a:endParaRPr>
-          </a:p>
-          <a:p>
-            <a:pPr marL="284040" indent="-281160">
-              <a:lnSpc>
-                <a:spcPct val="100000"/>
-              </a:lnSpc>
-              <a:spcBef>
-                <a:spcPts val="641"/>
-              </a:spcBef>
-              <a:buClr>
-                <a:srgbClr val="797a7d"/>
-              </a:buClr>
-              <a:buSzPct val="45000"/>
-              <a:buFont typeface="Wingdings" charset="2"/>
-              <a:buChar char=""/>
-            </a:pPr>
-            <a:r>
-              <a:rPr b="0" lang="en-US" sz="2800" spc="-49" strike="noStrike">
-                <a:solidFill>
-                  <a:srgbClr val="797a7d"/>
-                </a:solidFill>
-                <a:uFill>
-                  <a:solidFill>
-                    <a:srgbClr val="ffffff"/>
-                  </a:solidFill>
-                </a:uFill>
-                <a:latin typeface="Segoe UI Light"/>
-                <a:ea typeface="DejaVu Sans"/>
-              </a:rPr>
-              <a:t>Define cluster configuration, including cluster size, topology, and framework parameters (configurable templates are provided).</a:t>
-            </a:r>
-            <a:endParaRPr b="0" lang="en-US" sz="2800" spc="-1" strike="noStrike">
-              <a:solidFill>
-                <a:srgbClr val="000000"/>
-              </a:solidFill>
-              <a:uFill>
-                <a:solidFill>
-                  <a:srgbClr val="ffffff"/>
-                </a:solidFill>
-              </a:uFill>
-              <a:latin typeface="Arial"/>
-            </a:endParaRPr>
-          </a:p>
-          <a:p>
-            <a:pPr marL="284040" indent="-281160">
-              <a:lnSpc>
-                <a:spcPct val="100000"/>
-              </a:lnSpc>
-              <a:spcBef>
-                <a:spcPts val="641"/>
-              </a:spcBef>
-              <a:buClr>
-                <a:srgbClr val="797a7d"/>
-              </a:buClr>
-              <a:buSzPct val="45000"/>
-              <a:buFont typeface="Wingdings" charset="2"/>
-              <a:buChar char=""/>
-            </a:pPr>
-            <a:r>
-              <a:rPr b="0" lang="en-US" sz="2800" spc="-49" strike="noStrike">
-                <a:solidFill>
-                  <a:srgbClr val="797a7d"/>
-                </a:solidFill>
-                <a:uFill>
-                  <a:solidFill>
-                    <a:srgbClr val="ffffff"/>
-                  </a:solidFill>
-                </a:uFill>
-                <a:latin typeface="Segoe UI Light"/>
-                <a:ea typeface="DejaVu Sans"/>
-              </a:rPr>
-              <a:t>Provision the cluster; sahara will provision VMs, install and configure the data processing framework.</a:t>
-            </a:r>
-            <a:endParaRPr b="0" lang="en-US" sz="2800" spc="-1" strike="noStrike">
-              <a:solidFill>
-                <a:srgbClr val="000000"/>
-              </a:solidFill>
-              <a:uFill>
-                <a:solidFill>
-                  <a:srgbClr val="ffffff"/>
-                </a:solidFill>
-              </a:uFill>
-              <a:latin typeface="Arial"/>
-            </a:endParaRPr>
-          </a:p>
-          <a:p>
-            <a:pPr marL="284040" indent="-281160">
-              <a:lnSpc>
-                <a:spcPct val="100000"/>
-              </a:lnSpc>
-              <a:spcBef>
-                <a:spcPts val="641"/>
-              </a:spcBef>
-              <a:buClr>
-                <a:srgbClr val="797a7d"/>
-              </a:buClr>
-              <a:buSzPct val="45000"/>
-              <a:buFont typeface="Wingdings" charset="2"/>
-              <a:buChar char=""/>
-            </a:pPr>
-            <a:r>
-              <a:rPr b="0" lang="en-US" sz="2800" spc="-49" strike="noStrike">
-                <a:solidFill>
-                  <a:srgbClr val="797a7d"/>
-                </a:solidFill>
-                <a:uFill>
-                  <a:solidFill>
-                    <a:srgbClr val="ffffff"/>
-                  </a:solidFill>
-                </a:uFill>
-                <a:latin typeface="Segoe UI Light"/>
-                <a:ea typeface="DejaVu Sans"/>
-              </a:rPr>
-              <a:t>Perform operations on the cluster; add or remove nodes.</a:t>
-            </a:r>
-            <a:endParaRPr b="0" lang="en-US" sz="2800" spc="-1" strike="noStrike">
-              <a:solidFill>
-                <a:srgbClr val="000000"/>
-              </a:solidFill>
-              <a:uFill>
-                <a:solidFill>
-                  <a:srgbClr val="ffffff"/>
-                </a:solidFill>
-              </a:uFill>
-              <a:latin typeface="Arial"/>
-            </a:endParaRPr>
-          </a:p>
-          <a:p>
-            <a:pPr marL="284040" indent="-281160">
-              <a:lnSpc>
-                <a:spcPct val="100000"/>
-              </a:lnSpc>
-              <a:spcBef>
-                <a:spcPts val="641"/>
-              </a:spcBef>
-              <a:buClr>
-                <a:srgbClr val="797a7d"/>
-              </a:buClr>
-              <a:buSzPct val="45000"/>
-              <a:buFont typeface="Wingdings" charset="2"/>
-              <a:buChar char=""/>
-            </a:pPr>
-            <a:r>
-              <a:rPr b="0" lang="en-US" sz="2800" spc="-49" strike="noStrike">
-                <a:solidFill>
-                  <a:srgbClr val="797a7d"/>
-                </a:solidFill>
-                <a:uFill>
-                  <a:solidFill>
-                    <a:srgbClr val="ffffff"/>
-                  </a:solidFill>
-                </a:uFill>
-                <a:latin typeface="Segoe UI Light"/>
-                <a:ea typeface="DejaVu Sans"/>
-              </a:rPr>
-              <a:t>Terminate the cluster when it is no longer needed.</a:t>
-            </a:r>
-            <a:endParaRPr b="0" lang="en-US" sz="2800" spc="-1" strike="noStrike">
-              <a:solidFill>
-                <a:srgbClr val="000000"/>
-              </a:solidFill>
-              <a:uFill>
-                <a:solidFill>
-                  <a:srgbClr val="ffffff"/>
-                </a:solidFill>
-              </a:uFill>
-              <a:latin typeface="Arial"/>
-            </a:endParaRPr>
-          </a:p>
-          <a:p>
-            <a:pPr>
-              <a:lnSpc>
-                <a:spcPct val="100000"/>
-              </a:lnSpc>
-              <a:spcBef>
-                <a:spcPts val="641"/>
-              </a:spcBef>
-            </a:pPr>
-            <a:endParaRPr b="0" lang="en-US" sz="2800" spc="-1" strike="noStrike">
-              <a:solidFill>
-                <a:srgbClr val="000000"/>
-              </a:solidFill>
-              <a:uFill>
-                <a:solidFill>
-                  <a:srgbClr val="ffffff"/>
-                </a:solidFill>
-              </a:uFill>
-              <a:latin typeface="Arial"/>
-            </a:endParaRPr>
-          </a:p>
-          <a:p>
-            <a:pPr>
-              <a:lnSpc>
-                <a:spcPct val="100000"/>
-              </a:lnSpc>
-              <a:spcBef>
-                <a:spcPts val="641"/>
-              </a:spcBef>
-            </a:pPr>
-            <a:endParaRPr b="0" lang="en-US" sz="2800" spc="-1" strike="noStrike">
-              <a:solidFill>
-                <a:srgbClr val="000000"/>
-              </a:solidFill>
-              <a:uFill>
-                <a:solidFill>
-                  <a:srgbClr val="ffffff"/>
-                </a:solidFill>
-              </a:uFill>
-              <a:latin typeface="Arial"/>
-            </a:endParaRPr>
-          </a:p>
-        </p:txBody>
       </p:sp>
+      <p:pic>
+        <p:nvPicPr>
+          <p:cNvPr id="175" name="" descr=""/>
+          <p:cNvPicPr/>
+          <p:nvPr/>
+        </p:nvPicPr>
+        <p:blipFill>
+          <a:blip r:embed="rId1"/>
+          <a:stretch/>
+        </p:blipFill>
+        <p:spPr>
+          <a:xfrm>
+            <a:off x="548640" y="927360"/>
+            <a:ext cx="8958240" cy="5930280"/>
+          </a:xfrm>
+          <a:prstGeom prst="rect">
+            <a:avLst/>
+          </a:prstGeom>
+          <a:ln>
+            <a:noFill/>
+          </a:ln>
+        </p:spPr>
+      </p:pic>
     </p:spTree>
   </p:cSld>
   <p:timing>
@@ -13422,7 +13107,7 @@
         <p:spPr>
           <a:xfrm>
             <a:off x="519120" y="228600"/>
-            <a:ext cx="11145960" cy="744840"/>
+            <a:ext cx="11145240" cy="744120"/>
           </a:xfrm>
           <a:prstGeom prst="rect">
             <a:avLst/>
@@ -13447,7 +13132,7 @@
               </a:lnSpc>
             </a:pPr>
             <a:r>
-              <a:rPr b="0" lang="en-US" sz="5400" spc="-77" strike="noStrike">
+              <a:rPr b="0" lang="en-US" sz="5400" spc="-72" strike="noStrike">
                 <a:solidFill>
                   <a:srgbClr val="595959"/>
                 </a:solidFill>
@@ -13459,7 +13144,7 @@
                 <a:latin typeface="Segoe UI Light"/>
                 <a:ea typeface="DejaVu Sans"/>
               </a:rPr>
-              <a:t>Analitycs as a Service Workflow</a:t>
+              <a:t>Cluster Provisioning Workflow</a:t>
             </a:r>
             <a:endParaRPr b="0" lang="en-US" sz="5400" spc="-1" strike="noStrike">
               <a:solidFill>
@@ -13483,8 +13168,8 @@
         </p:nvSpPr>
         <p:spPr>
           <a:xfrm>
-            <a:off x="519120" y="1375920"/>
-            <a:ext cx="11145960" cy="2040840"/>
+            <a:off x="519120" y="1195920"/>
+            <a:ext cx="11145240" cy="2040120"/>
           </a:xfrm>
           <a:prstGeom prst="rect">
             <a:avLst/>
@@ -13503,7 +13188,7 @@
         <p:txBody>
           <a:bodyPr lIns="0" rIns="0" tIns="0" bIns="0"/>
           <a:p>
-            <a:pPr marL="284040" indent="-281160">
+            <a:pPr marL="284040" indent="-280440">
               <a:lnSpc>
                 <a:spcPct val="100000"/>
               </a:lnSpc>
@@ -13518,7 +13203,7 @@
               <a:buChar char=""/>
             </a:pPr>
             <a:r>
-              <a:rPr b="0" lang="en-US" sz="3200" spc="-49" strike="noStrike">
+              <a:rPr b="0" lang="en-US" sz="2800" spc="-43" strike="noStrike">
                 <a:solidFill>
                   <a:srgbClr val="797a7d"/>
                 </a:solidFill>
@@ -13530,22 +13215,22 @@
                 <a:latin typeface="Segoe UI Light"/>
                 <a:ea typeface="DejaVu Sans"/>
               </a:rPr>
-              <a:t>Select one of the predefined data processing framework versions.</a:t>
-            </a:r>
-            <a:endParaRPr b="0" lang="en-US" sz="3200" spc="-1" strike="noStrike">
-              <a:solidFill>
-                <a:srgbClr val="000000"/>
-              </a:solidFill>
-              <a:uFill>
-                <a:solidFill>
-                  <a:srgbClr val="ffffff"/>
-                </a:solidFill>
-              </a:uFill>
-              <a:latin typeface="Arial"/>
-            </a:endParaRPr>
-          </a:p>
-          <a:p>
-            <a:pPr marL="284040" indent="-281160">
+              <a:t>Select a Hadoop (or framework) version.</a:t>
+            </a:r>
+            <a:endParaRPr b="0" lang="en-US" sz="2800" spc="-1" strike="noStrike">
+              <a:solidFill>
+                <a:srgbClr val="000000"/>
+              </a:solidFill>
+              <a:uFill>
+                <a:solidFill>
+                  <a:srgbClr val="ffffff"/>
+                </a:solidFill>
+              </a:uFill>
+              <a:latin typeface="Arial"/>
+            </a:endParaRPr>
+          </a:p>
+          <a:p>
+            <a:pPr marL="284040" indent="-280440">
               <a:lnSpc>
                 <a:spcPct val="100000"/>
               </a:lnSpc>
@@ -13560,7 +13245,7 @@
               <a:buChar char=""/>
             </a:pPr>
             <a:r>
-              <a:rPr b="0" lang="en-US" sz="3200" spc="-49" strike="noStrike">
+              <a:rPr b="0" lang="en-US" sz="2800" spc="-43" strike="noStrike">
                 <a:solidFill>
                   <a:srgbClr val="797a7d"/>
                 </a:solidFill>
@@ -13572,22 +13257,38 @@
                 <a:latin typeface="Segoe UI Light"/>
                 <a:ea typeface="DejaVu Sans"/>
               </a:rPr>
-              <a:t>Configure a job.</a:t>
-            </a:r>
-            <a:endParaRPr b="0" lang="en-US" sz="3200" spc="-1" strike="noStrike">
-              <a:solidFill>
-                <a:srgbClr val="000000"/>
-              </a:solidFill>
-              <a:uFill>
-                <a:solidFill>
-                  <a:srgbClr val="ffffff"/>
-                </a:solidFill>
-              </a:uFill>
-              <a:latin typeface="Arial"/>
-            </a:endParaRPr>
-          </a:p>
-          <a:p>
-            <a:pPr marL="284040" indent="-281160">
+              <a:t>Select a base image with or without pre-installed data processing framework. Download prepared up-to-date images from </a:t>
+            </a:r>
+            <a:r>
+              <a:rPr b="0" lang="en-US" sz="2800" spc="-43" strike="noStrike" u="sng">
+                <a:solidFill>
+                  <a:srgbClr val="0000ff"/>
+                </a:solidFill>
+                <a:uFill>
+                  <a:solidFill>
+                    <a:srgbClr val="ffffff"/>
+                  </a:solidFill>
+                </a:uFill>
+                <a:latin typeface="Segoe UI Light"/>
+                <a:ea typeface="DejaVu Sans"/>
+                <a:hlinkClick r:id="rId1"/>
+              </a:rPr>
+              <a:t>http://sahara-files.mirantis.com/images/upstream/</a:t>
+            </a:r>
+            <a:endParaRPr b="0" lang="en-US" sz="2800" spc="-1" strike="noStrike">
+              <a:solidFill>
+                <a:srgbClr val="000000"/>
+              </a:solidFill>
+              <a:uFill>
+                <a:solidFill>
+                  <a:srgbClr val="ffffff"/>
+                </a:solidFill>
+              </a:uFill>
+              <a:latin typeface="Arial"/>
+            </a:endParaRPr>
+          </a:p>
+          <a:p>
+            <a:pPr marL="284040" indent="-280440">
               <a:lnSpc>
                 <a:spcPct val="100000"/>
               </a:lnSpc>
@@ -13602,7 +13303,7 @@
               <a:buChar char=""/>
             </a:pPr>
             <a:r>
-              <a:rPr b="0" lang="en-US" sz="3200" spc="-49" strike="noStrike">
+              <a:rPr b="0" lang="en-US" sz="2800" spc="-43" strike="noStrike">
                 <a:solidFill>
                   <a:srgbClr val="797a7d"/>
                 </a:solidFill>
@@ -13614,22 +13315,22 @@
                 <a:latin typeface="Segoe UI Light"/>
                 <a:ea typeface="DejaVu Sans"/>
               </a:rPr>
-              <a:t>Set the limit for the cluster size.</a:t>
-            </a:r>
-            <a:endParaRPr b="0" lang="en-US" sz="3200" spc="-1" strike="noStrike">
-              <a:solidFill>
-                <a:srgbClr val="000000"/>
-              </a:solidFill>
-              <a:uFill>
-                <a:solidFill>
-                  <a:srgbClr val="ffffff"/>
-                </a:solidFill>
-              </a:uFill>
-              <a:latin typeface="Arial"/>
-            </a:endParaRPr>
-          </a:p>
-          <a:p>
-            <a:pPr marL="284040" indent="-281160">
+              <a:t>Define cluster configuration, including cluster size, topology, and framework parameters (configurable templates are provided).</a:t>
+            </a:r>
+            <a:endParaRPr b="0" lang="en-US" sz="2800" spc="-1" strike="noStrike">
+              <a:solidFill>
+                <a:srgbClr val="000000"/>
+              </a:solidFill>
+              <a:uFill>
+                <a:solidFill>
+                  <a:srgbClr val="ffffff"/>
+                </a:solidFill>
+              </a:uFill>
+              <a:latin typeface="Arial"/>
+            </a:endParaRPr>
+          </a:p>
+          <a:p>
+            <a:pPr marL="284040" indent="-280440">
               <a:lnSpc>
                 <a:spcPct val="100000"/>
               </a:lnSpc>
@@ -13644,7 +13345,7 @@
               <a:buChar char=""/>
             </a:pPr>
             <a:r>
-              <a:rPr b="0" lang="en-US" sz="3200" spc="-49" strike="noStrike">
+              <a:rPr b="0" lang="en-US" sz="2800" spc="-43" strike="noStrike">
                 <a:solidFill>
                   <a:srgbClr val="797a7d"/>
                 </a:solidFill>
@@ -13656,22 +13357,22 @@
                 <a:latin typeface="Segoe UI Light"/>
                 <a:ea typeface="DejaVu Sans"/>
               </a:rPr>
-              <a:t>Execute the job.</a:t>
-            </a:r>
-            <a:endParaRPr b="0" lang="en-US" sz="3200" spc="-1" strike="noStrike">
-              <a:solidFill>
-                <a:srgbClr val="000000"/>
-              </a:solidFill>
-              <a:uFill>
-                <a:solidFill>
-                  <a:srgbClr val="ffffff"/>
-                </a:solidFill>
-              </a:uFill>
-              <a:latin typeface="Arial"/>
-            </a:endParaRPr>
-          </a:p>
-          <a:p>
-            <a:pPr marL="284040" indent="-281160">
+              <a:t>Provision the cluster; sahara will provision VMs, install and configure the data processing framework.</a:t>
+            </a:r>
+            <a:endParaRPr b="0" lang="en-US" sz="2800" spc="-1" strike="noStrike">
+              <a:solidFill>
+                <a:srgbClr val="000000"/>
+              </a:solidFill>
+              <a:uFill>
+                <a:solidFill>
+                  <a:srgbClr val="ffffff"/>
+                </a:solidFill>
+              </a:uFill>
+              <a:latin typeface="Arial"/>
+            </a:endParaRPr>
+          </a:p>
+          <a:p>
+            <a:pPr marL="284040" indent="-280440">
               <a:lnSpc>
                 <a:spcPct val="100000"/>
               </a:lnSpc>
@@ -13686,7 +13387,7 @@
               <a:buChar char=""/>
             </a:pPr>
             <a:r>
-              <a:rPr b="0" lang="en-US" sz="3200" spc="-49" strike="noStrike">
+              <a:rPr b="0" lang="en-US" sz="2800" spc="-43" strike="noStrike">
                 <a:solidFill>
                   <a:srgbClr val="797a7d"/>
                 </a:solidFill>
@@ -13698,9 +13399,93 @@
                 <a:latin typeface="Segoe UI Light"/>
                 <a:ea typeface="DejaVu Sans"/>
               </a:rPr>
-              <a:t>Get the results of computations (for example, from swift).</a:t>
-            </a:r>
-            <a:endParaRPr b="0" lang="en-US" sz="3200" spc="-1" strike="noStrike">
+              <a:t>Perform operations on the cluster; add or remove nodes.</a:t>
+            </a:r>
+            <a:endParaRPr b="0" lang="en-US" sz="2800" spc="-1" strike="noStrike">
+              <a:solidFill>
+                <a:srgbClr val="000000"/>
+              </a:solidFill>
+              <a:uFill>
+                <a:solidFill>
+                  <a:srgbClr val="ffffff"/>
+                </a:solidFill>
+              </a:uFill>
+              <a:latin typeface="Arial"/>
+            </a:endParaRPr>
+          </a:p>
+          <a:p>
+            <a:pPr marL="284040" indent="-280440">
+              <a:lnSpc>
+                <a:spcPct val="100000"/>
+              </a:lnSpc>
+              <a:spcBef>
+                <a:spcPts val="641"/>
+              </a:spcBef>
+              <a:buClr>
+                <a:srgbClr val="797a7d"/>
+              </a:buClr>
+              <a:buSzPct val="45000"/>
+              <a:buFont typeface="Wingdings" charset="2"/>
+              <a:buChar char=""/>
+            </a:pPr>
+            <a:r>
+              <a:rPr b="0" lang="en-US" sz="2800" spc="-43" strike="noStrike">
+                <a:solidFill>
+                  <a:srgbClr val="797a7d"/>
+                </a:solidFill>
+                <a:uFill>
+                  <a:solidFill>
+                    <a:srgbClr val="ffffff"/>
+                  </a:solidFill>
+                </a:uFill>
+                <a:latin typeface="Segoe UI Light"/>
+                <a:ea typeface="DejaVu Sans"/>
+              </a:rPr>
+              <a:t>Terminate the cluster when it is no longer needed.</a:t>
+            </a:r>
+            <a:endParaRPr b="0" lang="en-US" sz="2800" spc="-1" strike="noStrike">
+              <a:solidFill>
+                <a:srgbClr val="000000"/>
+              </a:solidFill>
+              <a:uFill>
+                <a:solidFill>
+                  <a:srgbClr val="ffffff"/>
+                </a:solidFill>
+              </a:uFill>
+              <a:latin typeface="Arial"/>
+            </a:endParaRPr>
+          </a:p>
+          <a:p>
+            <a:pPr>
+              <a:lnSpc>
+                <a:spcPct val="100000"/>
+              </a:lnSpc>
+              <a:spcBef>
+                <a:spcPts val="641"/>
+              </a:spcBef>
+            </a:pPr>
+            <a:endParaRPr b="0" lang="en-US" sz="2800" spc="-1" strike="noStrike">
+              <a:solidFill>
+                <a:srgbClr val="000000"/>
+              </a:solidFill>
+              <a:uFill>
+                <a:solidFill>
+                  <a:srgbClr val="ffffff"/>
+                </a:solidFill>
+              </a:uFill>
+              <a:latin typeface="Arial"/>
+            </a:endParaRPr>
+          </a:p>
+          <a:p>
+            <a:pPr>
+              <a:lnSpc>
+                <a:spcPct val="100000"/>
+              </a:lnSpc>
+              <a:spcBef>
+                <a:spcPts val="641"/>
+              </a:spcBef>
+            </a:pPr>
+            <a:endParaRPr b="0" lang="en-US" sz="2800" spc="-1" strike="noStrike">
               <a:solidFill>
                 <a:srgbClr val="000000"/>
               </a:solidFill>
@@ -13771,8 +13556,8 @@
         </p:nvSpPr>
         <p:spPr>
           <a:xfrm>
-            <a:off x="978840" y="2109600"/>
-            <a:ext cx="10234800" cy="994320"/>
+            <a:off x="519120" y="228600"/>
+            <a:ext cx="11145240" cy="744120"/>
           </a:xfrm>
           <a:prstGeom prst="rect">
             <a:avLst/>
@@ -13789,7 +13574,7 @@
           <a:fontRef idx="minor"/>
         </p:style>
         <p:txBody>
-          <a:bodyPr lIns="0" rIns="0" tIns="0" bIns="0" anchor="b"/>
+          <a:bodyPr lIns="0" rIns="0" tIns="0" bIns="0"/>
           <a:p>
             <a:pPr>
               <a:lnSpc>
@@ -13797,7 +13582,7 @@
               </a:lnSpc>
             </a:pPr>
             <a:r>
-              <a:rPr b="0" lang="en-US" sz="7200" spc="-128" strike="noStrike">
+              <a:rPr b="0" lang="en-US" sz="5400" spc="-72" strike="noStrike">
                 <a:solidFill>
                   <a:srgbClr val="595959"/>
                 </a:solidFill>
@@ -13809,9 +13594,248 @@
                 <a:latin typeface="Segoe UI Light"/>
                 <a:ea typeface="DejaVu Sans"/>
               </a:rPr>
-              <a:t>Demo Praktik Sahara</a:t>
-            </a:r>
-            <a:endParaRPr b="0" lang="en-US" sz="7200" spc="-1" strike="noStrike">
+              <a:t>Analitycs as a Service Workflow</a:t>
+            </a:r>
+            <a:endParaRPr b="0" lang="en-US" sz="5400" spc="-1" strike="noStrike">
+              <a:solidFill>
+                <a:srgbClr val="000000"/>
+              </a:solidFill>
+              <a:uFill>
+                <a:solidFill>
+                  <a:srgbClr val="ffffff"/>
+                </a:solidFill>
+              </a:uFill>
+              <a:latin typeface="Arial"/>
+            </a:endParaRPr>
+          </a:p>
+        </p:txBody>
+      </p:sp>
+      <p:sp>
+        <p:nvSpPr>
+          <p:cNvPr id="179" name="CustomShape 2"/>
+          <p:cNvSpPr/>
+          <p:nvPr/>
+        </p:nvSpPr>
+        <p:spPr>
+          <a:xfrm>
+            <a:off x="519120" y="1375920"/>
+            <a:ext cx="11145240" cy="2040120"/>
+          </a:xfrm>
+          <a:prstGeom prst="rect">
+            <a:avLst/>
+          </a:prstGeom>
+          <a:noFill/>
+          <a:ln>
+            <a:noFill/>
+          </a:ln>
+        </p:spPr>
+        <p:style>
+          <a:lnRef idx="0"/>
+          <a:fillRef idx="0"/>
+          <a:effectRef idx="0"/>
+          <a:fontRef idx="minor"/>
+        </p:style>
+        <p:txBody>
+          <a:bodyPr lIns="0" rIns="0" tIns="0" bIns="0"/>
+          <a:p>
+            <a:pPr marL="284040" indent="-280440">
+              <a:lnSpc>
+                <a:spcPct val="100000"/>
+              </a:lnSpc>
+              <a:spcBef>
+                <a:spcPts val="641"/>
+              </a:spcBef>
+              <a:buClr>
+                <a:srgbClr val="797a7d"/>
+              </a:buClr>
+              <a:buSzPct val="45000"/>
+              <a:buFont typeface="Wingdings" charset="2"/>
+              <a:buChar char=""/>
+            </a:pPr>
+            <a:r>
+              <a:rPr b="0" lang="en-US" sz="3200" spc="-43" strike="noStrike">
+                <a:solidFill>
+                  <a:srgbClr val="797a7d"/>
+                </a:solidFill>
+                <a:uFill>
+                  <a:solidFill>
+                    <a:srgbClr val="ffffff"/>
+                  </a:solidFill>
+                </a:uFill>
+                <a:latin typeface="Segoe UI Light"/>
+                <a:ea typeface="DejaVu Sans"/>
+              </a:rPr>
+              <a:t>Select one of the predefined data processing framework versions.</a:t>
+            </a:r>
+            <a:endParaRPr b="0" lang="en-US" sz="3200" spc="-1" strike="noStrike">
+              <a:solidFill>
+                <a:srgbClr val="000000"/>
+              </a:solidFill>
+              <a:uFill>
+                <a:solidFill>
+                  <a:srgbClr val="ffffff"/>
+                </a:solidFill>
+              </a:uFill>
+              <a:latin typeface="Arial"/>
+            </a:endParaRPr>
+          </a:p>
+          <a:p>
+            <a:pPr marL="284040" indent="-280440">
+              <a:lnSpc>
+                <a:spcPct val="100000"/>
+              </a:lnSpc>
+              <a:spcBef>
+                <a:spcPts val="641"/>
+              </a:spcBef>
+              <a:buClr>
+                <a:srgbClr val="797a7d"/>
+              </a:buClr>
+              <a:buSzPct val="45000"/>
+              <a:buFont typeface="Wingdings" charset="2"/>
+              <a:buChar char=""/>
+            </a:pPr>
+            <a:r>
+              <a:rPr b="0" lang="en-US" sz="3200" spc="-43" strike="noStrike">
+                <a:solidFill>
+                  <a:srgbClr val="797a7d"/>
+                </a:solidFill>
+                <a:uFill>
+                  <a:solidFill>
+                    <a:srgbClr val="ffffff"/>
+                  </a:solidFill>
+                </a:uFill>
+                <a:latin typeface="Segoe UI Light"/>
+                <a:ea typeface="DejaVu Sans"/>
+              </a:rPr>
+              <a:t>Configure a job.</a:t>
+            </a:r>
+            <a:endParaRPr b="0" lang="en-US" sz="3200" spc="-1" strike="noStrike">
+              <a:solidFill>
+                <a:srgbClr val="000000"/>
+              </a:solidFill>
+              <a:uFill>
+                <a:solidFill>
+                  <a:srgbClr val="ffffff"/>
+                </a:solidFill>
+              </a:uFill>
+              <a:latin typeface="Arial"/>
+            </a:endParaRPr>
+          </a:p>
+          <a:p>
+            <a:pPr marL="284040" indent="-280440">
+              <a:lnSpc>
+                <a:spcPct val="100000"/>
+              </a:lnSpc>
+              <a:spcBef>
+                <a:spcPts val="641"/>
+              </a:spcBef>
+              <a:buClr>
+                <a:srgbClr val="797a7d"/>
+              </a:buClr>
+              <a:buSzPct val="45000"/>
+              <a:buFont typeface="Wingdings" charset="2"/>
+              <a:buChar char=""/>
+            </a:pPr>
+            <a:r>
+              <a:rPr b="0" lang="en-US" sz="3200" spc="-43" strike="noStrike">
+                <a:solidFill>
+                  <a:srgbClr val="797a7d"/>
+                </a:solidFill>
+                <a:uFill>
+                  <a:solidFill>
+                    <a:srgbClr val="ffffff"/>
+                  </a:solidFill>
+                </a:uFill>
+                <a:latin typeface="Segoe UI Light"/>
+                <a:ea typeface="DejaVu Sans"/>
+              </a:rPr>
+              <a:t>Set the limit for the cluster size.</a:t>
+            </a:r>
+            <a:endParaRPr b="0" lang="en-US" sz="3200" spc="-1" strike="noStrike">
+              <a:solidFill>
+                <a:srgbClr val="000000"/>
+              </a:solidFill>
+              <a:uFill>
+                <a:solidFill>
+                  <a:srgbClr val="ffffff"/>
+                </a:solidFill>
+              </a:uFill>
+              <a:latin typeface="Arial"/>
+            </a:endParaRPr>
+          </a:p>
+          <a:p>
+            <a:pPr marL="284040" indent="-280440">
+              <a:lnSpc>
+                <a:spcPct val="100000"/>
+              </a:lnSpc>
+              <a:spcBef>
+                <a:spcPts val="641"/>
+              </a:spcBef>
+              <a:buClr>
+                <a:srgbClr val="797a7d"/>
+              </a:buClr>
+              <a:buSzPct val="45000"/>
+              <a:buFont typeface="Wingdings" charset="2"/>
+              <a:buChar char=""/>
+            </a:pPr>
+            <a:r>
+              <a:rPr b="0" lang="en-US" sz="3200" spc="-43" strike="noStrike">
+                <a:solidFill>
+                  <a:srgbClr val="797a7d"/>
+                </a:solidFill>
+                <a:uFill>
+                  <a:solidFill>
+                    <a:srgbClr val="ffffff"/>
+                  </a:solidFill>
+                </a:uFill>
+                <a:latin typeface="Segoe UI Light"/>
+                <a:ea typeface="DejaVu Sans"/>
+              </a:rPr>
+              <a:t>Execute the job.</a:t>
+            </a:r>
+            <a:endParaRPr b="0" lang="en-US" sz="3200" spc="-1" strike="noStrike">
+              <a:solidFill>
+                <a:srgbClr val="000000"/>
+              </a:solidFill>
+              <a:uFill>
+                <a:solidFill>
+                  <a:srgbClr val="ffffff"/>
+                </a:solidFill>
+              </a:uFill>
+              <a:latin typeface="Arial"/>
+            </a:endParaRPr>
+          </a:p>
+          <a:p>
+            <a:pPr marL="284040" indent="-280440">
+              <a:lnSpc>
+                <a:spcPct val="100000"/>
+              </a:lnSpc>
+              <a:spcBef>
+                <a:spcPts val="641"/>
+              </a:spcBef>
+              <a:buClr>
+                <a:srgbClr val="797a7d"/>
+              </a:buClr>
+              <a:buSzPct val="45000"/>
+              <a:buFont typeface="Wingdings" charset="2"/>
+              <a:buChar char=""/>
+            </a:pPr>
+            <a:r>
+              <a:rPr b="0" lang="en-US" sz="3200" spc="-43" strike="noStrike">
+                <a:solidFill>
+                  <a:srgbClr val="797a7d"/>
+                </a:solidFill>
+                <a:uFill>
+                  <a:solidFill>
+                    <a:srgbClr val="ffffff"/>
+                  </a:solidFill>
+                </a:uFill>
+                <a:latin typeface="Segoe UI Light"/>
+                <a:ea typeface="DejaVu Sans"/>
+              </a:rPr>
+              <a:t>Get the results of computations (for example, from swift).</a:t>
+            </a:r>
+            <a:endParaRPr b="0" lang="en-US" sz="3200" spc="-1" strike="noStrike">
               <a:solidFill>
                 <a:srgbClr val="000000"/>
               </a:solidFill>
@@ -13876,14 +13900,14 @@
       </p:grpSpPr>
       <p:sp>
         <p:nvSpPr>
-          <p:cNvPr id="179" name="CustomShape 1"/>
+          <p:cNvPr id="180" name="CustomShape 1"/>
           <p:cNvSpPr/>
           <p:nvPr/>
         </p:nvSpPr>
         <p:spPr>
           <a:xfrm>
             <a:off x="978840" y="2109600"/>
-            <a:ext cx="10234800" cy="994320"/>
+            <a:ext cx="10234080" cy="993600"/>
           </a:xfrm>
           <a:prstGeom prst="rect">
             <a:avLst/>
@@ -13908,7 +13932,7 @@
               </a:lnSpc>
             </a:pPr>
             <a:r>
-              <a:rPr b="0" lang="en-US" sz="7200" spc="-128" strike="noStrike">
+              <a:rPr b="0" lang="en-US" sz="7200" spc="-123" strike="noStrike">
                 <a:solidFill>
                   <a:srgbClr val="595959"/>
                 </a:solidFill>
@@ -13920,74 +13944,9 @@
                 <a:latin typeface="Segoe UI Light"/>
                 <a:ea typeface="DejaVu Sans"/>
               </a:rPr>
-              <a:t>Terima Kasih</a:t>
+              <a:t>Demo Praktik Sahara</a:t>
             </a:r>
             <a:endParaRPr b="0" lang="en-US" sz="7200" spc="-1" strike="noStrike">
-              <a:solidFill>
-                <a:srgbClr val="000000"/>
-              </a:solidFill>
-              <a:uFill>
-                <a:solidFill>
-                  <a:srgbClr val="ffffff"/>
-                </a:solidFill>
-              </a:uFill>
-              <a:latin typeface="Arial"/>
-            </a:endParaRPr>
-          </a:p>
-        </p:txBody>
-      </p:sp>
-      <p:sp>
-        <p:nvSpPr>
-          <p:cNvPr id="180" name="CustomShape 2"/>
-          <p:cNvSpPr/>
-          <p:nvPr/>
-        </p:nvSpPr>
-        <p:spPr>
-          <a:xfrm>
-            <a:off x="1102680" y="3188880"/>
-            <a:ext cx="9450720" cy="645120"/>
-          </a:xfrm>
-          <a:prstGeom prst="rect">
-            <a:avLst/>
-          </a:prstGeom>
-          <a:noFill/>
-          <a:ln>
-            <a:noFill/>
-          </a:ln>
-        </p:spPr>
-        <p:style>
-          <a:lnRef idx="0"/>
-          <a:fillRef idx="0"/>
-          <a:effectRef idx="0"/>
-          <a:fontRef idx="minor"/>
-        </p:style>
-        <p:txBody>
-          <a:bodyPr lIns="99000" rIns="99000" tIns="49680" bIns="49680"/>
-          <a:p>
-            <a:pPr>
-              <a:lnSpc>
-                <a:spcPct val="90000"/>
-              </a:lnSpc>
-              <a:spcBef>
-                <a:spcPts val="720"/>
-              </a:spcBef>
-            </a:pPr>
-            <a:r>
-              <a:rPr b="0" lang="en-US" sz="3600" spc="-1" strike="noStrike">
-                <a:solidFill>
-                  <a:srgbClr val="595959"/>
-                </a:solidFill>
-                <a:uFill>
-                  <a:solidFill>
-                    <a:srgbClr val="ffffff"/>
-                  </a:solidFill>
-                </a:uFill>
-                <a:latin typeface="Segoe UI Light"/>
-                <a:ea typeface="DejaVu Sans"/>
-              </a:rPr>
-              <a:t>www.acci.or.id</a:t>
-            </a:r>
-            <a:endParaRPr b="0" lang="en-US" sz="3600" spc="-1" strike="noStrike">
               <a:solidFill>
                 <a:srgbClr val="000000"/>
               </a:solidFill>
@@ -14010,6 +13969,182 @@
           <p:childTnLst>
             <p:seq>
               <p:cTn id="74" nodeType="mainSeq"/>
+              <p:prevCondLst>
+                <p:cond delay="0" evt="onPrev">
+                  <p:tgtEl>
+                    <p:sldTgt/>
+                  </p:tgtEl>
+                </p:cond>
+              </p:prevCondLst>
+              <p:nextCondLst>
+                <p:cond delay="0" evt="onNext">
+                  <p:tgtEl>
+                    <p:sldTgt/>
+                  </p:tgtEl>
+                </p:cond>
+              </p:nextCondLst>
+            </p:seq>
+          </p:childTnLst>
+        </p:cTn>
+      </p:par>
+    </p:tnLst>
+  </p:timing>
+</p:sld>
+</file>
+
+<file path=ppt/slides/slide38.xml><?xml version="1.0" encoding="utf-8"?>
+<p:sld xmlns:a="http://schemas.openxmlformats.org/drawingml/2006/main" xmlns:p="http://schemas.openxmlformats.org/presentationml/2006/main" xmlns:r="http://schemas.openxmlformats.org/officeDocument/2006/relationships" xmlns:p14="http://schemas.microsoft.com/office/powerpoint/2010/main" xmlns:p15="http://schemas.microsoft.com/office/powerpoint/2012/main" xmlns:mc="http://schemas.openxmlformats.org/markup-compatibility/2006">
+  <p:cSld>
+    <p:spTree>
+      <p:nvGrpSpPr>
+        <p:cNvPr id="1" name=""/>
+        <p:cNvGrpSpPr/>
+        <p:nvPr/>
+      </p:nvGrpSpPr>
+      <p:grpSpPr>
+        <a:xfrm>
+          <a:off x="0" y="0"/>
+          <a:ext cx="0" cy="0"/>
+          <a:chOff x="0" y="0"/>
+          <a:chExt cx="0" cy="0"/>
+        </a:xfrm>
+      </p:grpSpPr>
+      <p:sp>
+        <p:nvSpPr>
+          <p:cNvPr id="181" name="CustomShape 1"/>
+          <p:cNvSpPr/>
+          <p:nvPr/>
+        </p:nvSpPr>
+        <p:spPr>
+          <a:xfrm>
+            <a:off x="978840" y="2109600"/>
+            <a:ext cx="10234080" cy="993600"/>
+          </a:xfrm>
+          <a:prstGeom prst="rect">
+            <a:avLst/>
+          </a:prstGeom>
+          <a:noFill/>
+          <a:ln>
+            <a:noFill/>
+          </a:ln>
+        </p:spPr>
+        <p:style>
+          <a:lnRef idx="0"/>
+          <a:fillRef idx="0"/>
+          <a:effectRef idx="0"/>
+          <a:fontRef idx="minor"/>
+        </p:style>
+        <p:txBody>
+          <a:bodyPr lIns="0" rIns="0" tIns="0" bIns="0" anchor="b"/>
+          <a:p>
+            <a:pPr>
+              <a:lnSpc>
+                <a:spcPct val="100000"/>
+              </a:lnSpc>
+            </a:pPr>
+            <a:r>
+              <a:rPr b="0" lang="en-US" sz="7200" spc="-123" strike="noStrike">
+                <a:solidFill>
+                  <a:srgbClr val="595959"/>
+                </a:solidFill>
+                <a:uFill>
+                  <a:solidFill>
+                    <a:srgbClr val="ffffff"/>
+                  </a:solidFill>
+                </a:uFill>
+                <a:latin typeface="Segoe UI Light"/>
+                <a:ea typeface="DejaVu Sans"/>
+              </a:rPr>
+              <a:t>Terima Kasih</a:t>
+            </a:r>
+            <a:endParaRPr b="0" lang="en-US" sz="7200" spc="-1" strike="noStrike">
+              <a:solidFill>
+                <a:srgbClr val="000000"/>
+              </a:solidFill>
+              <a:uFill>
+                <a:solidFill>
+                  <a:srgbClr val="ffffff"/>
+                </a:solidFill>
+              </a:uFill>
+              <a:latin typeface="Arial"/>
+            </a:endParaRPr>
+          </a:p>
+        </p:txBody>
+      </p:sp>
+      <p:sp>
+        <p:nvSpPr>
+          <p:cNvPr id="182" name="CustomShape 2"/>
+          <p:cNvSpPr/>
+          <p:nvPr/>
+        </p:nvSpPr>
+        <p:spPr>
+          <a:xfrm>
+            <a:off x="1102680" y="3188880"/>
+            <a:ext cx="9450000" cy="644400"/>
+          </a:xfrm>
+          <a:prstGeom prst="rect">
+            <a:avLst/>
+          </a:prstGeom>
+          <a:noFill/>
+          <a:ln>
+            <a:noFill/>
+          </a:ln>
+        </p:spPr>
+        <p:style>
+          <a:lnRef idx="0"/>
+          <a:fillRef idx="0"/>
+          <a:effectRef idx="0"/>
+          <a:fontRef idx="minor"/>
+        </p:style>
+        <p:txBody>
+          <a:bodyPr lIns="99000" rIns="99000" tIns="49680" bIns="49680"/>
+          <a:p>
+            <a:pPr>
+              <a:lnSpc>
+                <a:spcPct val="90000"/>
+              </a:lnSpc>
+              <a:spcBef>
+                <a:spcPts val="720"/>
+              </a:spcBef>
+            </a:pPr>
+            <a:r>
+              <a:rPr b="0" lang="en-US" sz="3600" spc="-1" strike="noStrike">
+                <a:solidFill>
+                  <a:srgbClr val="595959"/>
+                </a:solidFill>
+                <a:uFill>
+                  <a:solidFill>
+                    <a:srgbClr val="ffffff"/>
+                  </a:solidFill>
+                </a:uFill>
+                <a:latin typeface="Segoe UI Light"/>
+                <a:ea typeface="DejaVu Sans"/>
+              </a:rPr>
+              <a:t>www.acci.or.id</a:t>
+            </a:r>
+            <a:endParaRPr b="0" lang="en-US" sz="3600" spc="-1" strike="noStrike">
+              <a:solidFill>
+                <a:srgbClr val="000000"/>
+              </a:solidFill>
+              <a:uFill>
+                <a:solidFill>
+                  <a:srgbClr val="ffffff"/>
+                </a:solidFill>
+              </a:uFill>
+              <a:latin typeface="Arial"/>
+            </a:endParaRPr>
+          </a:p>
+        </p:txBody>
+      </p:sp>
+    </p:spTree>
+  </p:cSld>
+  <p:timing>
+    <p:tnLst>
+      <p:par>
+        <p:cTn id="75" dur="indefinite" restart="never" nodeType="tmRoot">
+          <p:childTnLst>
+            <p:seq>
+              <p:cTn id="76" nodeType="mainSeq"/>
               <p:prevCondLst>
                 <p:cond delay="0" evt="onPrev">
                   <p:tgtEl>
@@ -14059,7 +14194,7 @@
         <p:spPr>
           <a:xfrm>
             <a:off x="519120" y="228600"/>
-            <a:ext cx="11145960" cy="744840"/>
+            <a:ext cx="11145240" cy="744120"/>
           </a:xfrm>
           <a:prstGeom prst="rect">
             <a:avLst/>
@@ -14084,7 +14219,7 @@
               </a:lnSpc>
             </a:pPr>
             <a:r>
-              <a:rPr b="0" lang="en-US" sz="5400" spc="-77" strike="noStrike">
+              <a:rPr b="0" lang="en-US" sz="5400" spc="-72" strike="noStrike">
                 <a:solidFill>
                   <a:srgbClr val="595959"/>
                 </a:solidFill>
@@ -14121,7 +14256,7 @@
         <p:spPr>
           <a:xfrm>
             <a:off x="519120" y="1447920"/>
-            <a:ext cx="11145960" cy="2040840"/>
+            <a:ext cx="11145240" cy="2040120"/>
           </a:xfrm>
           <a:prstGeom prst="rect">
             <a:avLst/>
@@ -14140,7 +14275,7 @@
         <p:txBody>
           <a:bodyPr lIns="0" rIns="0" tIns="0" bIns="0"/>
           <a:p>
-            <a:pPr marL="284040" indent="-281160">
+            <a:pPr marL="284040" indent="-280440">
               <a:lnSpc>
                 <a:spcPct val="100000"/>
               </a:lnSpc>
@@ -14155,7 +14290,7 @@
               <a:buChar char=""/>
             </a:pPr>
             <a:r>
-              <a:rPr b="0" lang="en-US" sz="3200" spc="-49" strike="noStrike">
+              <a:rPr b="0" lang="en-US" sz="3200" spc="-43" strike="noStrike">
                 <a:solidFill>
                   <a:srgbClr val="797a7d"/>
                 </a:solidFill>
@@ -14182,7 +14317,7 @@
             </a:endParaRPr>
           </a:p>
           <a:p>
-            <a:pPr marL="284040" indent="-281160">
+            <a:pPr marL="284040" indent="-280440">
               <a:lnSpc>
                 <a:spcPct val="100000"/>
               </a:lnSpc>
@@ -14197,7 +14332,7 @@
               <a:buChar char=""/>
             </a:pPr>
             <a:r>
-              <a:rPr b="0" lang="en-US" sz="3200" spc="-49" strike="noStrike">
+              <a:rPr b="0" lang="en-US" sz="3200" spc="-43" strike="noStrike">
                 <a:solidFill>
                   <a:srgbClr val="797a7d"/>
                 </a:solidFill>
@@ -14224,7 +14359,7 @@
             </a:endParaRPr>
           </a:p>
           <a:p>
-            <a:pPr marL="284040" indent="-281160">
+            <a:pPr marL="284040" indent="-280440">
               <a:lnSpc>
                 <a:spcPct val="100000"/>
               </a:lnSpc>
@@ -14239,7 +14374,7 @@
               <a:buChar char=""/>
             </a:pPr>
             <a:r>
-              <a:rPr b="0" lang="en-US" sz="3200" spc="-49" strike="noStrike">
+              <a:rPr b="0" lang="en-US" sz="3200" spc="-43" strike="noStrike">
                 <a:solidFill>
                   <a:srgbClr val="797a7d"/>
                 </a:solidFill>
@@ -14266,7 +14401,7 @@
             </a:endParaRPr>
           </a:p>
           <a:p>
-            <a:pPr marL="284040" indent="-281160">
+            <a:pPr marL="284040" indent="-280440">
               <a:lnSpc>
                 <a:spcPct val="100000"/>
               </a:lnSpc>
@@ -14281,7 +14416,7 @@
               <a:buChar char=""/>
             </a:pPr>
             <a:r>
-              <a:rPr b="0" lang="en-US" sz="3200" spc="-49" strike="noStrike">
+              <a:rPr b="0" lang="en-US" sz="3200" spc="-43" strike="noStrike">
                 <a:solidFill>
                   <a:srgbClr val="797a7d"/>
                 </a:solidFill>
@@ -14367,7 +14502,7 @@
         <p:spPr>
           <a:xfrm>
             <a:off x="519120" y="228600"/>
-            <a:ext cx="11145960" cy="744840"/>
+            <a:ext cx="11145240" cy="744120"/>
           </a:xfrm>
           <a:prstGeom prst="rect">
             <a:avLst/>
@@ -14392,7 +14527,7 @@
               </a:lnSpc>
             </a:pPr>
             <a:r>
-              <a:rPr b="0" lang="en-US" sz="5400" spc="-77" strike="noStrike">
+              <a:rPr b="0" lang="en-US" sz="5400" spc="-72" strike="noStrike">
                 <a:solidFill>
                   <a:srgbClr val="595959"/>
                 </a:solidFill>
@@ -14429,7 +14564,7 @@
         <p:spPr>
           <a:xfrm>
             <a:off x="519120" y="1447920"/>
-            <a:ext cx="11145960" cy="2040840"/>
+            <a:ext cx="11145240" cy="2040120"/>
           </a:xfrm>
           <a:prstGeom prst="rect">
             <a:avLst/>
@@ -14448,7 +14583,7 @@
         <p:txBody>
           <a:bodyPr lIns="0" rIns="0" tIns="0" bIns="0"/>
           <a:p>
-            <a:pPr marL="284040" indent="-281160">
+            <a:pPr marL="284040" indent="-280440">
               <a:lnSpc>
                 <a:spcPct val="100000"/>
               </a:lnSpc>
@@ -14463,7 +14598,7 @@
               <a:buChar char=""/>
             </a:pPr>
             <a:r>
-              <a:rPr b="0" lang="en-US" sz="3200" spc="-49" strike="noStrike">
+              <a:rPr b="0" lang="en-US" sz="3200" spc="-43" strike="noStrike">
                 <a:solidFill>
                   <a:srgbClr val="797a7d"/>
                 </a:solidFill>
@@ -14478,7 +14613,7 @@
               <a:t>Web OpenStack: </a:t>
             </a:r>
             <a:r>
-              <a:rPr b="0" lang="en-US" sz="3200" spc="-49" strike="noStrike" u="sng">
+              <a:rPr b="0" lang="en-US" sz="3200" spc="-43" strike="noStrike" u="sng">
                 <a:solidFill>
                   <a:srgbClr val="0000ff"/>
                 </a:solidFill>
@@ -14506,7 +14641,7 @@
             </a:endParaRPr>
           </a:p>
           <a:p>
-            <a:pPr marL="284040" indent="-281160">
+            <a:pPr marL="284040" indent="-280440">
               <a:lnSpc>
                 <a:spcPct val="100000"/>
               </a:lnSpc>
@@ -14521,7 +14656,7 @@
               <a:buChar char=""/>
             </a:pPr>
             <a:r>
-              <a:rPr b="0" lang="en-US" sz="3200" spc="-49" strike="noStrike">
+              <a:rPr b="0" lang="en-US" sz="3200" spc="-43" strike="noStrike">
                 <a:solidFill>
                   <a:srgbClr val="797a7d"/>
                 </a:solidFill>
@@ -14536,7 +14671,7 @@
               <a:t>Dokumentasi OpenStack: </a:t>
             </a:r>
             <a:r>
-              <a:rPr b="0" lang="en-US" sz="3200" spc="-49" strike="noStrike" u="sng">
+              <a:rPr b="0" lang="en-US" sz="3200" spc="-43" strike="noStrike" u="sng">
                 <a:solidFill>
                   <a:srgbClr val="0000ff"/>
                 </a:solidFill>
@@ -14644,7 +14779,7 @@
         <p:spPr>
           <a:xfrm>
             <a:off x="978840" y="2109600"/>
-            <a:ext cx="10234800" cy="994320"/>
+            <a:ext cx="10234080" cy="993600"/>
           </a:xfrm>
           <a:prstGeom prst="rect">
             <a:avLst/>
@@ -14669,7 +14804,7 @@
               </a:lnSpc>
             </a:pPr>
             <a:r>
-              <a:rPr b="0" lang="en-US" sz="7200" spc="-128" strike="noStrike">
+              <a:rPr b="0" lang="en-US" sz="7200" spc="-123" strike="noStrike">
                 <a:solidFill>
                   <a:srgbClr val="595959"/>
                 </a:solidFill>
@@ -14755,7 +14890,7 @@
         <p:spPr>
           <a:xfrm>
             <a:off x="519120" y="228600"/>
-            <a:ext cx="11145960" cy="744840"/>
+            <a:ext cx="11145240" cy="744120"/>
           </a:xfrm>
           <a:prstGeom prst="rect">
             <a:avLst/>
@@ -14780,7 +14915,7 @@
               </a:lnSpc>
             </a:pPr>
             <a:r>
-              <a:rPr b="0" lang="en-US" sz="5400" spc="-77" strike="noStrike">
+              <a:rPr b="0" lang="en-US" sz="5400" spc="-72" strike="noStrike">
                 <a:solidFill>
                   <a:srgbClr val="595959"/>
                 </a:solidFill>
@@ -14817,7 +14952,7 @@
         <p:spPr>
           <a:xfrm>
             <a:off x="519120" y="3967920"/>
-            <a:ext cx="11145960" cy="2040840"/>
+            <a:ext cx="11145240" cy="2040120"/>
           </a:xfrm>
           <a:prstGeom prst="rect">
             <a:avLst/>
@@ -14836,7 +14971,7 @@
         <p:txBody>
           <a:bodyPr lIns="0" rIns="0" tIns="0" bIns="0"/>
           <a:p>
-            <a:pPr marL="284040" indent="-281160">
+            <a:pPr marL="284040" indent="-280440">
               <a:lnSpc>
                 <a:spcPct val="100000"/>
               </a:lnSpc>
@@ -14851,7 +14986,7 @@
               <a:buChar char=""/>
             </a:pPr>
             <a:r>
-              <a:rPr b="0" lang="en-US" sz="2800" spc="-49" strike="noStrike">
+              <a:rPr b="0" lang="en-US" sz="2800" spc="-43" strike="noStrike">
                 <a:solidFill>
                   <a:srgbClr val="797a7d"/>
                 </a:solidFill>
@@ -14866,7 +15001,7 @@
               <a:t>Perangkat lunak sumber terbuka untuk membangun </a:t>
             </a:r>
             <a:r>
-              <a:rPr b="0" i="1" lang="en-US" sz="2800" spc="-49" strike="noStrike">
+              <a:rPr b="0" i="1" lang="en-US" sz="2800" spc="-43" strike="noStrike">
                 <a:solidFill>
                   <a:srgbClr val="797a7d"/>
                 </a:solidFill>
@@ -14881,7 +15016,7 @@
               <a:t>Infrastructure as a Service (IaaS) cloud</a:t>
             </a:r>
             <a:r>
-              <a:rPr b="0" lang="en-US" sz="2800" spc="-49" strike="noStrike">
+              <a:rPr b="0" lang="en-US" sz="2800" spc="-43" strike="noStrike">
                 <a:solidFill>
                   <a:srgbClr val="797a7d"/>
                 </a:solidFill>
@@ -14908,7 +15043,7 @@
             </a:endParaRPr>
           </a:p>
           <a:p>
-            <a:pPr marL="284040" indent="-281160">
+            <a:pPr marL="284040" indent="-280440">
               <a:lnSpc>
                 <a:spcPct val="100000"/>
               </a:lnSpc>
@@ -14923,7 +15058,7 @@
               <a:buChar char=""/>
             </a:pPr>
             <a:r>
-              <a:rPr b="0" lang="en-US" sz="2800" spc="-49" strike="noStrike">
+              <a:rPr b="0" lang="en-US" sz="2800" spc="-43" strike="noStrike">
                 <a:solidFill>
                   <a:srgbClr val="797a7d"/>
                 </a:solidFill>
@@ -14938,7 +15073,7 @@
               <a:t>Dikembangkan di bawah Yayasan OpenStack dengan dukungan perusahaan-perusahaan TIK populer di seluruh dunia (</a:t>
             </a:r>
             <a:r>
-              <a:rPr b="0" lang="en-US" sz="2800" spc="-49" strike="noStrike" u="sng">
+              <a:rPr b="0" lang="en-US" sz="2800" spc="-43" strike="noStrike" u="sng">
                 <a:solidFill>
                   <a:srgbClr val="0000ff"/>
                 </a:solidFill>
@@ -14954,7 +15089,7 @@
               <a:t>https://www.openstack.org/foundation/companies/</a:t>
             </a:r>
             <a:r>
-              <a:rPr b="0" lang="en-US" sz="2800" spc="-49" strike="noStrike">
+              <a:rPr b="0" lang="en-US" sz="2800" spc="-43" strike="noStrike">
                 <a:solidFill>
                   <a:srgbClr val="797a7d"/>
                 </a:solidFill>
@@ -14995,7 +15130,7 @@
         <p:spPr>
           <a:xfrm>
             <a:off x="4794480" y="1400400"/>
-            <a:ext cx="2659320" cy="2283480"/>
+            <a:ext cx="2658600" cy="2282760"/>
           </a:xfrm>
           <a:prstGeom prst="rect">
             <a:avLst/>
@@ -15063,7 +15198,7 @@
         <p:spPr>
           <a:xfrm>
             <a:off x="519120" y="228600"/>
-            <a:ext cx="11145960" cy="744840"/>
+            <a:ext cx="11145240" cy="744120"/>
           </a:xfrm>
           <a:prstGeom prst="rect">
             <a:avLst/>
@@ -15088,7 +15223,7 @@
               </a:lnSpc>
             </a:pPr>
             <a:r>
-              <a:rPr b="0" lang="en-US" sz="5400" spc="-77" strike="noStrike">
+              <a:rPr b="0" lang="en-US" sz="5400" spc="-72" strike="noStrike">
                 <a:solidFill>
                   <a:srgbClr val="595959"/>
                 </a:solidFill>
@@ -15129,7 +15264,7 @@
         <p:spPr>
           <a:xfrm>
             <a:off x="834120" y="1439640"/>
-            <a:ext cx="10198800" cy="4474080"/>
+            <a:ext cx="10198080" cy="4473360"/>
           </a:xfrm>
           <a:prstGeom prst="rect">
             <a:avLst/>
@@ -15197,7 +15332,7 @@
         <p:spPr>
           <a:xfrm>
             <a:off x="519120" y="228600"/>
-            <a:ext cx="11145960" cy="744840"/>
+            <a:ext cx="11145240" cy="744120"/>
           </a:xfrm>
           <a:prstGeom prst="rect">
             <a:avLst/>
@@ -15222,7 +15357,7 @@
               </a:lnSpc>
             </a:pPr>
             <a:r>
-              <a:rPr b="0" lang="en-US" sz="5400" spc="-77" strike="noStrike">
+              <a:rPr b="0" lang="en-US" sz="5400" spc="-72" strike="noStrike">
                 <a:solidFill>
                   <a:srgbClr val="595959"/>
                 </a:solidFill>
@@ -15263,7 +15398,7 @@
         <p:spPr>
           <a:xfrm>
             <a:off x="1001160" y="1176480"/>
-            <a:ext cx="10246320" cy="4531320"/>
+            <a:ext cx="10245600" cy="4530600"/>
           </a:xfrm>
           <a:prstGeom prst="rect">
             <a:avLst/>

</xml_diff>